<commit_message>
adding scratch html pages to start building
</commit_message>
<xml_diff>
--- a/WanderMust_Proposal.pptx
+++ b/WanderMust_Proposal.pptx
@@ -10,6 +10,10 @@
     <p:sldId id="258" r:id="rId4"/>
     <p:sldId id="259" r:id="rId5"/>
     <p:sldId id="260" r:id="rId6"/>
+    <p:sldId id="261" r:id="rId7"/>
+    <p:sldId id="262" r:id="rId8"/>
+    <p:sldId id="263" r:id="rId9"/>
+    <p:sldId id="264" r:id="rId10"/>
   </p:sldIdLst>
   <p:sldSz cx="7772400" cy="10058400"/>
   <p:notesSz cx="6858000" cy="9144000"/>
@@ -580,7 +584,7 @@
             <a:fld id="{E30E2307-1E40-4E12-8716-25BFDA8E7013}" type="datetime1">
               <a:rPr lang="en-US" smtClean="0"/>
               <a:pPr/>
-              <a:t>5/9/18</a:t>
+              <a:t>5/11/18</a:t>
             </a:fld>
             <a:endParaRPr lang="en-US"/>
           </a:p>
@@ -747,7 +751,7 @@
             <a:fld id="{E5CFCF5A-EA79-452C-A52C-1A2668C2E7DF}" type="datetime1">
               <a:rPr lang="en-US" smtClean="0"/>
               <a:pPr/>
-              <a:t>5/9/18</a:t>
+              <a:t>5/11/18</a:t>
             </a:fld>
             <a:endParaRPr lang="en-US"/>
           </a:p>
@@ -924,7 +928,7 @@
             <a:fld id="{2E5C4C28-BD4B-4892-9A2D-6E19BD753A9A}" type="datetime1">
               <a:rPr lang="en-US" smtClean="0"/>
               <a:pPr/>
-              <a:t>5/9/18</a:t>
+              <a:t>5/11/18</a:t>
             </a:fld>
             <a:endParaRPr lang="en-US"/>
           </a:p>
@@ -1091,7 +1095,7 @@
             <a:fld id="{61FD9D02-426E-46C9-9EE9-0DE1EF8B2838}" type="datetime1">
               <a:rPr lang="en-US" smtClean="0"/>
               <a:pPr/>
-              <a:t>5/9/18</a:t>
+              <a:t>5/11/18</a:t>
             </a:fld>
             <a:endParaRPr lang="en-US"/>
           </a:p>
@@ -1646,7 +1650,7 @@
             <a:fld id="{7B8AEBBE-F8B2-42CF-9895-E86A608384EB}" type="datetime1">
               <a:rPr lang="en-US" smtClean="0"/>
               <a:pPr/>
-              <a:t>5/9/18</a:t>
+              <a:t>5/11/18</a:t>
             </a:fld>
             <a:endParaRPr lang="en-US"/>
           </a:p>
@@ -1908,7 +1912,7 @@
             <a:fld id="{E1FAA6B6-10E5-4810-BC9F-DA72D8452E73}" type="datetime1">
               <a:rPr lang="en-US" smtClean="0"/>
               <a:pPr/>
-              <a:t>5/9/18</a:t>
+              <a:t>5/11/18</a:t>
             </a:fld>
             <a:endParaRPr lang="en-US"/>
           </a:p>
@@ -2398,7 +2402,7 @@
             <a:fld id="{6D18D072-EF12-4AA2-BD71-ABC68B06D0E2}" type="datetime1">
               <a:rPr lang="en-US" smtClean="0"/>
               <a:pPr/>
-              <a:t>5/9/18</a:t>
+              <a:t>5/11/18</a:t>
             </a:fld>
             <a:endParaRPr lang="en-US"/>
           </a:p>
@@ -2513,7 +2517,7 @@
             <a:fld id="{B8CDBF60-6CC3-4B74-A60D-3486985E4346}" type="datetime1">
               <a:rPr lang="en-US" smtClean="0"/>
               <a:pPr/>
-              <a:t>5/9/18</a:t>
+              <a:t>5/11/18</a:t>
             </a:fld>
             <a:endParaRPr lang="en-US"/>
           </a:p>
@@ -2605,7 +2609,7 @@
             <a:fld id="{22714818-984F-4759-BF72-A33BDC1963BD}" type="datetime1">
               <a:rPr lang="en-US" smtClean="0"/>
               <a:pPr/>
-              <a:t>5/9/18</a:t>
+              <a:t>5/11/18</a:t>
             </a:fld>
             <a:endParaRPr lang="en-US"/>
           </a:p>
@@ -3037,7 +3041,7 @@
             <a:fld id="{9EA7E191-5F94-4FC1-B823-BD7CABF7FA06}" type="datetime1">
               <a:rPr lang="en-US" smtClean="0"/>
               <a:pPr/>
-              <a:t>5/9/18</a:t>
+              <a:t>5/11/18</a:t>
             </a:fld>
             <a:endParaRPr lang="en-US"/>
           </a:p>
@@ -3572,7 +3576,7 @@
             <a:fld id="{88856D55-EFBE-4F9B-8A5F-09D42CA22A9B}" type="datetime1">
               <a:rPr lang="en-US" smtClean="0"/>
               <a:pPr/>
-              <a:t>5/9/18</a:t>
+              <a:t>5/11/18</a:t>
             </a:fld>
             <a:endParaRPr lang="en-US"/>
           </a:p>
@@ -4414,7 +4418,7 @@
             <a:fld id="{9D1D110F-3F4E-48D9-B8AA-5D0E825AFDBA}" type="datetime1">
               <a:rPr lang="en-US" smtClean="0"/>
               <a:pPr/>
-              <a:t>5/9/18</a:t>
+              <a:t>5/11/18</a:t>
             </a:fld>
             <a:endParaRPr lang="en-US"/>
           </a:p>
@@ -7102,6 +7106,937 @@
 </p:sld>
 </file>
 
+<file path=ppt/slides/slide6.xml><?xml version="1.0" encoding="utf-8"?>
+<p:sld xmlns:a="http://schemas.openxmlformats.org/drawingml/2006/main" xmlns:r="http://schemas.openxmlformats.org/officeDocument/2006/relationships" xmlns:p="http://schemas.openxmlformats.org/presentationml/2006/main">
+  <p:cSld>
+    <p:spTree>
+      <p:nvGrpSpPr>
+        <p:cNvPr id="1" name=""/>
+        <p:cNvGrpSpPr/>
+        <p:nvPr/>
+      </p:nvGrpSpPr>
+      <p:grpSpPr>
+        <a:xfrm>
+          <a:off x="0" y="0"/>
+          <a:ext cx="0" cy="0"/>
+          <a:chOff x="0" y="0"/>
+          <a:chExt cx="0" cy="0"/>
+        </a:xfrm>
+      </p:grpSpPr>
+      <p:sp>
+        <p:nvSpPr>
+          <p:cNvPr id="5" name="Title 4"/>
+          <p:cNvSpPr>
+            <a:spLocks noGrp="1"/>
+          </p:cNvSpPr>
+          <p:nvPr>
+            <p:ph type="title"/>
+          </p:nvPr>
+        </p:nvSpPr>
+        <p:spPr/>
+        <p:txBody>
+          <a:bodyPr/>
+          <a:lstStyle/>
+          <a:p>
+            <a:r>
+              <a:rPr lang="en-US" dirty="0" smtClean="0"/>
+              <a:t>Requirements</a:t>
+            </a:r>
+            <a:endParaRPr lang="en-US" dirty="0"/>
+          </a:p>
+        </p:txBody>
+      </p:sp>
+      <p:sp>
+        <p:nvSpPr>
+          <p:cNvPr id="6" name="Content Placeholder 5"/>
+          <p:cNvSpPr>
+            <a:spLocks noGrp="1"/>
+          </p:cNvSpPr>
+          <p:nvPr>
+            <p:ph idx="1"/>
+          </p:nvPr>
+        </p:nvSpPr>
+        <p:spPr/>
+        <p:txBody>
+          <a:bodyPr/>
+          <a:lstStyle/>
+          <a:p>
+            <a:pPr>
+              <a:buFont typeface="+mj-lt"/>
+              <a:buAutoNum type="arabicPeriod"/>
+            </a:pPr>
+            <a:r>
+              <a:rPr lang="en-US" dirty="0" smtClean="0"/>
+              <a:t>Node &amp; Express Web-Server</a:t>
+            </a:r>
+          </a:p>
+          <a:p>
+            <a:pPr>
+              <a:buFont typeface="+mj-lt"/>
+              <a:buAutoNum type="arabicPeriod"/>
+            </a:pPr>
+            <a:r>
+              <a:rPr lang="en-US" dirty="0" smtClean="0"/>
+              <a:t>MYSQL Database with a </a:t>
+            </a:r>
+            <a:r>
+              <a:rPr lang="en-US" dirty="0" err="1" smtClean="0"/>
+              <a:t>Sequelize</a:t>
+            </a:r>
+            <a:r>
+              <a:rPr lang="en-US" dirty="0" smtClean="0"/>
+              <a:t> ORM</a:t>
+            </a:r>
+          </a:p>
+          <a:p>
+            <a:pPr>
+              <a:buFont typeface="+mj-lt"/>
+              <a:buAutoNum type="arabicPeriod"/>
+            </a:pPr>
+            <a:r>
+              <a:rPr lang="en-US" dirty="0" smtClean="0"/>
+              <a:t>GET &amp; POST Routes</a:t>
+            </a:r>
+          </a:p>
+          <a:p>
+            <a:pPr>
+              <a:buFont typeface="+mj-lt"/>
+              <a:buAutoNum type="arabicPeriod"/>
+            </a:pPr>
+            <a:r>
+              <a:rPr lang="en-US" dirty="0" smtClean="0"/>
+              <a:t>Basic Testing Framework</a:t>
+            </a:r>
+          </a:p>
+          <a:p>
+            <a:pPr>
+              <a:buFont typeface="+mj-lt"/>
+              <a:buAutoNum type="arabicPeriod"/>
+            </a:pPr>
+            <a:r>
+              <a:rPr lang="en-US" dirty="0" smtClean="0"/>
+              <a:t>Deployed using </a:t>
+            </a:r>
+            <a:r>
+              <a:rPr lang="en-US" dirty="0" err="1" smtClean="0"/>
+              <a:t>Heroku</a:t>
+            </a:r>
+            <a:r>
+              <a:rPr lang="en-US" dirty="0" smtClean="0"/>
+              <a:t> (with data)</a:t>
+            </a:r>
+          </a:p>
+          <a:p>
+            <a:pPr>
+              <a:buFont typeface="+mj-lt"/>
+              <a:buAutoNum type="arabicPeriod"/>
+            </a:pPr>
+            <a:r>
+              <a:rPr lang="en-US" dirty="0" smtClean="0"/>
+              <a:t>1+ new library, package or </a:t>
+            </a:r>
+            <a:r>
+              <a:rPr lang="en-US" dirty="0" err="1" smtClean="0"/>
+              <a:t>technolog</a:t>
+            </a:r>
+            <a:endParaRPr lang="en-US" dirty="0" smtClean="0"/>
+          </a:p>
+          <a:p>
+            <a:pPr>
+              <a:buFont typeface="+mj-lt"/>
+              <a:buAutoNum type="arabicPeriod"/>
+            </a:pPr>
+            <a:r>
+              <a:rPr lang="en-US" dirty="0" smtClean="0"/>
+              <a:t>Polished front /UI</a:t>
+            </a:r>
+          </a:p>
+          <a:p>
+            <a:pPr>
+              <a:buFont typeface="+mj-lt"/>
+              <a:buAutoNum type="arabicPeriod"/>
+            </a:pPr>
+            <a:r>
+              <a:rPr lang="en-US" dirty="0" smtClean="0"/>
+              <a:t>MVC Paradigm Folder structure</a:t>
+            </a:r>
+          </a:p>
+          <a:p>
+            <a:pPr>
+              <a:buFont typeface="+mj-lt"/>
+              <a:buAutoNum type="arabicPeriod"/>
+            </a:pPr>
+            <a:r>
+              <a:rPr lang="en-US" dirty="0" smtClean="0"/>
+              <a:t>Quality coding standards</a:t>
+            </a:r>
+          </a:p>
+          <a:p>
+            <a:pPr>
+              <a:buFont typeface="+mj-lt"/>
+              <a:buAutoNum type="arabicPeriod"/>
+            </a:pPr>
+            <a:endParaRPr lang="en-US" dirty="0"/>
+          </a:p>
+          <a:p>
+            <a:pPr marL="0" indent="0"/>
+            <a:r>
+              <a:rPr lang="en-US" dirty="0" smtClean="0"/>
+              <a:t>Bonus!</a:t>
+            </a:r>
+          </a:p>
+          <a:p>
+            <a:pPr>
+              <a:buFont typeface="+mj-lt"/>
+              <a:buAutoNum type="arabicPeriod"/>
+            </a:pPr>
+            <a:r>
+              <a:rPr lang="en-US" dirty="0" smtClean="0"/>
+              <a:t>Utilize Handlebars for server-side </a:t>
+            </a:r>
+            <a:r>
+              <a:rPr lang="en-US" dirty="0" err="1" smtClean="0"/>
+              <a:t>templating</a:t>
+            </a:r>
+            <a:endParaRPr lang="en-US" dirty="0" smtClean="0"/>
+          </a:p>
+          <a:p>
+            <a:pPr>
+              <a:buFont typeface="+mj-lt"/>
+              <a:buAutoNum type="arabicPeriod"/>
+            </a:pPr>
+            <a:r>
+              <a:rPr lang="en-US" dirty="0" smtClean="0"/>
+              <a:t>Incorporate authentication</a:t>
+            </a:r>
+          </a:p>
+          <a:p>
+            <a:pPr>
+              <a:buFont typeface="+mj-lt"/>
+              <a:buAutoNum type="arabicPeriod"/>
+            </a:pPr>
+            <a:r>
+              <a:rPr lang="en-US" dirty="0" smtClean="0"/>
+              <a:t>Use an existing public dataset to power the database</a:t>
+            </a:r>
+          </a:p>
+          <a:p>
+            <a:pPr>
+              <a:buFont typeface="+mj-lt"/>
+              <a:buAutoNum type="arabicPeriod"/>
+            </a:pPr>
+            <a:r>
+              <a:rPr lang="en-US" dirty="0" smtClean="0"/>
+              <a:t>Create a migration strategy for sharing data among the team</a:t>
+            </a:r>
+          </a:p>
+          <a:p>
+            <a:pPr>
+              <a:buFont typeface="+mj-lt"/>
+              <a:buAutoNum type="arabicPeriod"/>
+            </a:pPr>
+            <a:endParaRPr lang="en-US" dirty="0"/>
+          </a:p>
+        </p:txBody>
+      </p:sp>
+    </p:spTree>
+    <p:extLst>
+      <p:ext uri="{BB962C8B-B14F-4D97-AF65-F5344CB8AC3E}">
+        <p14:creationId xmlns:p14="http://schemas.microsoft.com/office/powerpoint/2010/main" val="2361404160"/>
+      </p:ext>
+    </p:extLst>
+  </p:cSld>
+  <p:clrMapOvr>
+    <a:masterClrMapping/>
+  </p:clrMapOvr>
+  <p:timing>
+    <p:tnLst>
+      <p:par>
+        <p:cTn xmlns:p14="http://schemas.microsoft.com/office/powerpoint/2010/main" id="1" dur="indefinite" restart="never" nodeType="tmRoot"/>
+      </p:par>
+    </p:tnLst>
+  </p:timing>
+</p:sld>
+</file>
+
+<file path=ppt/slides/slide7.xml><?xml version="1.0" encoding="utf-8"?>
+<p:sld xmlns:a="http://schemas.openxmlformats.org/drawingml/2006/main" xmlns:r="http://schemas.openxmlformats.org/officeDocument/2006/relationships" xmlns:p="http://schemas.openxmlformats.org/presentationml/2006/main">
+  <p:cSld>
+    <p:spTree>
+      <p:nvGrpSpPr>
+        <p:cNvPr id="1" name=""/>
+        <p:cNvGrpSpPr/>
+        <p:nvPr/>
+      </p:nvGrpSpPr>
+      <p:grpSpPr>
+        <a:xfrm>
+          <a:off x="0" y="0"/>
+          <a:ext cx="0" cy="0"/>
+          <a:chOff x="0" y="0"/>
+          <a:chExt cx="0" cy="0"/>
+        </a:xfrm>
+      </p:grpSpPr>
+      <p:sp>
+        <p:nvSpPr>
+          <p:cNvPr id="2" name="Title 1"/>
+          <p:cNvSpPr>
+            <a:spLocks noGrp="1"/>
+          </p:cNvSpPr>
+          <p:nvPr>
+            <p:ph type="title"/>
+          </p:nvPr>
+        </p:nvSpPr>
+        <p:spPr/>
+        <p:txBody>
+          <a:bodyPr/>
+          <a:lstStyle/>
+          <a:p>
+            <a:r>
+              <a:rPr lang="en-US" dirty="0" smtClean="0"/>
+              <a:t>My Trips</a:t>
+            </a:r>
+            <a:endParaRPr lang="en-US" dirty="0"/>
+          </a:p>
+        </p:txBody>
+      </p:sp>
+      <p:pic>
+        <p:nvPicPr>
+          <p:cNvPr id="4" name="Picture 3"/>
+          <p:cNvPicPr>
+            <a:picLocks noChangeAspect="1"/>
+          </p:cNvPicPr>
+          <p:nvPr/>
+        </p:nvPicPr>
+        <p:blipFill rotWithShape="1">
+          <a:blip r:embed="rId2"/>
+          <a:srcRect r="33894"/>
+          <a:stretch/>
+        </p:blipFill>
+        <p:spPr>
+          <a:xfrm>
+            <a:off x="233030" y="1548236"/>
+            <a:ext cx="3492500" cy="3492500"/>
+          </a:xfrm>
+          <a:prstGeom prst="rect">
+            <a:avLst/>
+          </a:prstGeom>
+        </p:spPr>
+      </p:pic>
+      <p:pic>
+        <p:nvPicPr>
+          <p:cNvPr id="5" name="Picture 4" descr="images.png"/>
+          <p:cNvPicPr>
+            <a:picLocks noChangeAspect="1"/>
+          </p:cNvPicPr>
+          <p:nvPr/>
+        </p:nvPicPr>
+        <p:blipFill>
+          <a:blip r:embed="rId3">
+            <a:extLst>
+              <a:ext uri="{BEBA8EAE-BF5A-486C-A8C5-ECC9F3942E4B}">
+                <a14:imgProps xmlns:a14="http://schemas.microsoft.com/office/drawing/2010/main">
+                  <a14:imgLayer r:embed="rId4">
+                    <a14:imgEffect>
+                      <a14:backgroundRemoval t="889" b="98667" l="0" r="100000">
+                        <a14:foregroundMark x1="5333" y1="5333" x2="91556" y2="6222"/>
+                        <a14:foregroundMark x1="34667" y1="17333" x2="59556" y2="17333"/>
+                        <a14:foregroundMark x1="7111" y1="92444" x2="97778" y2="93778"/>
+                        <a14:backgroundMark x1="34222" y1="12444" x2="64444" y2="11111"/>
+                        <a14:backgroundMark x1="5333" y1="29778" x2="7111" y2="84889"/>
+                        <a14:backgroundMark x1="6222" y1="87556" x2="96000" y2="88000"/>
+                        <a14:backgroundMark x1="95111" y1="84889" x2="92889" y2="27556"/>
+                        <a14:backgroundMark x1="93333" y1="26667" x2="5333" y2="30667"/>
+                        <a14:backgroundMark x1="68000" y1="23111" x2="66222" y2="11111"/>
+                        <a14:backgroundMark x1="32444" y1="10222" x2="32444" y2="13778"/>
+                        <a14:backgroundMark x1="9333" y1="76889" x2="94222" y2="76889"/>
+                        <a14:backgroundMark x1="10222" y1="34222" x2="90667" y2="71556"/>
+                        <a14:backgroundMark x1="75111" y1="70667" x2="12000" y2="67556"/>
+                        <a14:backgroundMark x1="34667" y1="35111" x2="87111" y2="58222"/>
+                      </a14:backgroundRemoval>
+                    </a14:imgEffect>
+                  </a14:imgLayer>
+                </a14:imgProps>
+              </a:ext>
+              <a:ext uri="{28A0092B-C50C-407E-A947-70E740481C1C}">
+                <a14:useLocalDpi xmlns:a14="http://schemas.microsoft.com/office/drawing/2010/main" val="0"/>
+              </a:ext>
+            </a:extLst>
+          </a:blip>
+          <a:stretch>
+            <a:fillRect/>
+          </a:stretch>
+        </p:blipFill>
+        <p:spPr>
+          <a:xfrm>
+            <a:off x="233030" y="1548237"/>
+            <a:ext cx="3492500" cy="3492500"/>
+          </a:xfrm>
+          <a:prstGeom prst="rect">
+            <a:avLst/>
+          </a:prstGeom>
+        </p:spPr>
+      </p:pic>
+      <p:sp>
+        <p:nvSpPr>
+          <p:cNvPr id="6" name="TextBox 5"/>
+          <p:cNvSpPr txBox="1"/>
+          <p:nvPr/>
+        </p:nvSpPr>
+        <p:spPr>
+          <a:xfrm>
+            <a:off x="387408" y="2309160"/>
+            <a:ext cx="3120798" cy="830997"/>
+          </a:xfrm>
+          <a:prstGeom prst="rect">
+            <a:avLst/>
+          </a:prstGeom>
+          <a:noFill/>
+        </p:spPr>
+        <p:txBody>
+          <a:bodyPr wrap="square" rtlCol="0">
+            <a:spAutoFit/>
+          </a:bodyPr>
+          <a:lstStyle/>
+          <a:p>
+            <a:r>
+              <a:rPr lang="en-US" sz="4800" dirty="0" smtClean="0">
+                <a:solidFill>
+                  <a:schemeClr val="bg1"/>
+                </a:solidFill>
+                <a:effectLst>
+                  <a:outerShdw blurRad="50800" dist="38100" dir="2700000" algn="tl" rotWithShape="0">
+                    <a:srgbClr val="000000">
+                      <a:alpha val="43000"/>
+                    </a:srgbClr>
+                  </a:outerShdw>
+                </a:effectLst>
+                <a:latin typeface="SignPainter-HouseScript"/>
+                <a:cs typeface="SignPainter-HouseScript"/>
+              </a:rPr>
+              <a:t>Bangkok</a:t>
+            </a:r>
+            <a:endParaRPr lang="en-US" sz="4800" dirty="0">
+              <a:solidFill>
+                <a:schemeClr val="bg1"/>
+              </a:solidFill>
+              <a:effectLst>
+                <a:outerShdw blurRad="50800" dist="38100" dir="2700000" algn="tl" rotWithShape="0">
+                  <a:srgbClr val="000000">
+                    <a:alpha val="43000"/>
+                  </a:srgbClr>
+                </a:outerShdw>
+              </a:effectLst>
+              <a:latin typeface="SignPainter-HouseScript"/>
+              <a:cs typeface="SignPainter-HouseScript"/>
+            </a:endParaRPr>
+          </a:p>
+        </p:txBody>
+      </p:sp>
+      <p:sp>
+        <p:nvSpPr>
+          <p:cNvPr id="8" name="Rounded Rectangle 7"/>
+          <p:cNvSpPr/>
+          <p:nvPr/>
+        </p:nvSpPr>
+        <p:spPr>
+          <a:xfrm>
+            <a:off x="1355932" y="3954714"/>
+            <a:ext cx="2195320" cy="688857"/>
+          </a:xfrm>
+          <a:prstGeom prst="roundRect">
+            <a:avLst/>
+          </a:prstGeom>
+        </p:spPr>
+        <p:style>
+          <a:lnRef idx="1">
+            <a:schemeClr val="accent1"/>
+          </a:lnRef>
+          <a:fillRef idx="3">
+            <a:schemeClr val="accent1"/>
+          </a:fillRef>
+          <a:effectRef idx="2">
+            <a:schemeClr val="accent1"/>
+          </a:effectRef>
+          <a:fontRef idx="minor">
+            <a:schemeClr val="lt1"/>
+          </a:fontRef>
+        </p:style>
+        <p:txBody>
+          <a:bodyPr rtlCol="0" anchor="ctr"/>
+          <a:lstStyle/>
+          <a:p>
+            <a:pPr algn="ctr"/>
+            <a:r>
+              <a:rPr lang="en-US" dirty="0" smtClean="0">
+                <a:latin typeface="Abadi MT Condensed Extra Bold"/>
+                <a:cs typeface="Abadi MT Condensed Extra Bold"/>
+              </a:rPr>
+              <a:t>July 24 </a:t>
+            </a:r>
+            <a:r>
+              <a:rPr lang="mr-IN" dirty="0" smtClean="0">
+                <a:latin typeface="Abadi MT Condensed Extra Bold"/>
+                <a:cs typeface="Abadi MT Condensed Extra Bold"/>
+              </a:rPr>
+              <a:t>–</a:t>
+            </a:r>
+            <a:r>
+              <a:rPr lang="en-US" dirty="0" smtClean="0">
+                <a:latin typeface="Abadi MT Condensed Extra Bold"/>
+                <a:cs typeface="Abadi MT Condensed Extra Bold"/>
+              </a:rPr>
+              <a:t> Aug 7</a:t>
+            </a:r>
+          </a:p>
+          <a:p>
+            <a:pPr algn="ctr"/>
+            <a:r>
+              <a:rPr lang="en-US" dirty="0" smtClean="0">
+                <a:latin typeface="Abadi MT Condensed Extra Bold"/>
+                <a:cs typeface="Abadi MT Condensed Extra Bold"/>
+              </a:rPr>
+              <a:t>16days Adventure</a:t>
+            </a:r>
+            <a:endParaRPr lang="en-US" dirty="0">
+              <a:latin typeface="Abadi MT Condensed Extra Bold"/>
+              <a:cs typeface="Abadi MT Condensed Extra Bold"/>
+            </a:endParaRPr>
+          </a:p>
+        </p:txBody>
+      </p:sp>
+      <p:pic>
+        <p:nvPicPr>
+          <p:cNvPr id="9" name="Picture 8"/>
+          <p:cNvPicPr>
+            <a:picLocks noChangeAspect="1"/>
+          </p:cNvPicPr>
+          <p:nvPr/>
+        </p:nvPicPr>
+        <p:blipFill rotWithShape="1">
+          <a:blip r:embed="rId5"/>
+          <a:srcRect l="12672" r="14339"/>
+          <a:stretch/>
+        </p:blipFill>
+        <p:spPr>
+          <a:xfrm>
+            <a:off x="3922953" y="1548237"/>
+            <a:ext cx="3492501" cy="3273953"/>
+          </a:xfrm>
+          <a:prstGeom prst="rect">
+            <a:avLst/>
+          </a:prstGeom>
+        </p:spPr>
+      </p:pic>
+      <p:pic>
+        <p:nvPicPr>
+          <p:cNvPr id="11" name="Picture 10" descr="images.png"/>
+          <p:cNvPicPr>
+            <a:picLocks noChangeAspect="1"/>
+          </p:cNvPicPr>
+          <p:nvPr/>
+        </p:nvPicPr>
+        <p:blipFill>
+          <a:blip r:embed="rId3">
+            <a:extLst>
+              <a:ext uri="{BEBA8EAE-BF5A-486C-A8C5-ECC9F3942E4B}">
+                <a14:imgProps xmlns:a14="http://schemas.microsoft.com/office/drawing/2010/main">
+                  <a14:imgLayer r:embed="rId4">
+                    <a14:imgEffect>
+                      <a14:backgroundRemoval t="889" b="98667" l="0" r="100000">
+                        <a14:foregroundMark x1="5333" y1="5333" x2="91556" y2="6222"/>
+                        <a14:foregroundMark x1="34667" y1="17333" x2="59556" y2="17333"/>
+                        <a14:foregroundMark x1="7111" y1="92444" x2="97778" y2="93778"/>
+                        <a14:backgroundMark x1="34222" y1="12444" x2="64444" y2="11111"/>
+                        <a14:backgroundMark x1="5333" y1="29778" x2="7111" y2="84889"/>
+                        <a14:backgroundMark x1="6222" y1="87556" x2="96000" y2="88000"/>
+                        <a14:backgroundMark x1="95111" y1="84889" x2="92889" y2="27556"/>
+                        <a14:backgroundMark x1="93333" y1="26667" x2="5333" y2="30667"/>
+                        <a14:backgroundMark x1="68000" y1="23111" x2="66222" y2="11111"/>
+                        <a14:backgroundMark x1="32444" y1="10222" x2="32444" y2="13778"/>
+                        <a14:backgroundMark x1="9333" y1="76889" x2="94222" y2="76889"/>
+                        <a14:backgroundMark x1="10222" y1="34222" x2="90667" y2="71556"/>
+                        <a14:backgroundMark x1="75111" y1="70667" x2="12000" y2="67556"/>
+                        <a14:backgroundMark x1="34667" y1="35111" x2="87111" y2="58222"/>
+                      </a14:backgroundRemoval>
+                    </a14:imgEffect>
+                  </a14:imgLayer>
+                </a14:imgProps>
+              </a:ext>
+              <a:ext uri="{28A0092B-C50C-407E-A947-70E740481C1C}">
+                <a14:useLocalDpi xmlns:a14="http://schemas.microsoft.com/office/drawing/2010/main" val="0"/>
+              </a:ext>
+            </a:extLst>
+          </a:blip>
+          <a:stretch>
+            <a:fillRect/>
+          </a:stretch>
+        </p:blipFill>
+        <p:spPr>
+          <a:xfrm>
+            <a:off x="3920976" y="1548237"/>
+            <a:ext cx="3492500" cy="3492500"/>
+          </a:xfrm>
+          <a:prstGeom prst="rect">
+            <a:avLst/>
+          </a:prstGeom>
+        </p:spPr>
+      </p:pic>
+      <p:sp>
+        <p:nvSpPr>
+          <p:cNvPr id="12" name="TextBox 11"/>
+          <p:cNvSpPr txBox="1"/>
+          <p:nvPr/>
+        </p:nvSpPr>
+        <p:spPr>
+          <a:xfrm>
+            <a:off x="3971517" y="2391338"/>
+            <a:ext cx="3120798" cy="830997"/>
+          </a:xfrm>
+          <a:prstGeom prst="rect">
+            <a:avLst/>
+          </a:prstGeom>
+          <a:noFill/>
+        </p:spPr>
+        <p:txBody>
+          <a:bodyPr wrap="square" rtlCol="0">
+            <a:spAutoFit/>
+          </a:bodyPr>
+          <a:lstStyle/>
+          <a:p>
+            <a:r>
+              <a:rPr lang="en-US" sz="4800" dirty="0" smtClean="0">
+                <a:solidFill>
+                  <a:schemeClr val="bg1"/>
+                </a:solidFill>
+                <a:effectLst>
+                  <a:outerShdw blurRad="50800" dist="38100" dir="2700000" algn="tl" rotWithShape="0">
+                    <a:srgbClr val="000000">
+                      <a:alpha val="43000"/>
+                    </a:srgbClr>
+                  </a:outerShdw>
+                </a:effectLst>
+                <a:latin typeface="SignPainter-HouseScript"/>
+                <a:cs typeface="SignPainter-HouseScript"/>
+              </a:rPr>
+              <a:t>Chicago</a:t>
+            </a:r>
+            <a:endParaRPr lang="en-US" sz="4800" dirty="0">
+              <a:solidFill>
+                <a:schemeClr val="bg1"/>
+              </a:solidFill>
+              <a:effectLst>
+                <a:outerShdw blurRad="50800" dist="38100" dir="2700000" algn="tl" rotWithShape="0">
+                  <a:srgbClr val="000000">
+                    <a:alpha val="43000"/>
+                  </a:srgbClr>
+                </a:outerShdw>
+              </a:effectLst>
+              <a:latin typeface="SignPainter-HouseScript"/>
+              <a:cs typeface="SignPainter-HouseScript"/>
+            </a:endParaRPr>
+          </a:p>
+        </p:txBody>
+      </p:sp>
+      <p:sp>
+        <p:nvSpPr>
+          <p:cNvPr id="13" name="Rounded Rectangle 12"/>
+          <p:cNvSpPr/>
+          <p:nvPr/>
+        </p:nvSpPr>
+        <p:spPr>
+          <a:xfrm>
+            <a:off x="4994196" y="4014480"/>
+            <a:ext cx="2195320" cy="688857"/>
+          </a:xfrm>
+          <a:prstGeom prst="roundRect">
+            <a:avLst/>
+          </a:prstGeom>
+        </p:spPr>
+        <p:style>
+          <a:lnRef idx="1">
+            <a:schemeClr val="accent1"/>
+          </a:lnRef>
+          <a:fillRef idx="3">
+            <a:schemeClr val="accent1"/>
+          </a:fillRef>
+          <a:effectRef idx="2">
+            <a:schemeClr val="accent1"/>
+          </a:effectRef>
+          <a:fontRef idx="minor">
+            <a:schemeClr val="lt1"/>
+          </a:fontRef>
+        </p:style>
+        <p:txBody>
+          <a:bodyPr rtlCol="0" anchor="ctr"/>
+          <a:lstStyle/>
+          <a:p>
+            <a:pPr algn="ctr"/>
+            <a:r>
+              <a:rPr lang="en-US" dirty="0" smtClean="0">
+                <a:latin typeface="Abadi MT Condensed Extra Bold"/>
+                <a:cs typeface="Abadi MT Condensed Extra Bold"/>
+              </a:rPr>
+              <a:t>Sept. 15 </a:t>
+            </a:r>
+            <a:r>
+              <a:rPr lang="mr-IN" dirty="0" smtClean="0">
+                <a:latin typeface="Abadi MT Condensed Extra Bold"/>
+                <a:cs typeface="Abadi MT Condensed Extra Bold"/>
+              </a:rPr>
+              <a:t>–</a:t>
+            </a:r>
+            <a:r>
+              <a:rPr lang="en-US" dirty="0" smtClean="0">
+                <a:latin typeface="Abadi MT Condensed Extra Bold"/>
+                <a:cs typeface="Abadi MT Condensed Extra Bold"/>
+              </a:rPr>
+              <a:t> Sept 18</a:t>
+            </a:r>
+          </a:p>
+          <a:p>
+            <a:pPr algn="ctr"/>
+            <a:r>
+              <a:rPr lang="en-US" dirty="0" smtClean="0">
+                <a:latin typeface="Abadi MT Condensed Extra Bold"/>
+                <a:cs typeface="Abadi MT Condensed Extra Bold"/>
+              </a:rPr>
+              <a:t>3days Business</a:t>
+            </a:r>
+            <a:endParaRPr lang="en-US" dirty="0">
+              <a:latin typeface="Abadi MT Condensed Extra Bold"/>
+              <a:cs typeface="Abadi MT Condensed Extra Bold"/>
+            </a:endParaRPr>
+          </a:p>
+        </p:txBody>
+      </p:sp>
+    </p:spTree>
+    <p:extLst>
+      <p:ext uri="{BB962C8B-B14F-4D97-AF65-F5344CB8AC3E}">
+        <p14:creationId xmlns:p14="http://schemas.microsoft.com/office/powerpoint/2010/main" val="3000596660"/>
+      </p:ext>
+    </p:extLst>
+  </p:cSld>
+  <p:clrMapOvr>
+    <a:masterClrMapping/>
+  </p:clrMapOvr>
+  <p:timing>
+    <p:tnLst>
+      <p:par>
+        <p:cTn xmlns:p14="http://schemas.microsoft.com/office/powerpoint/2010/main" id="1" dur="indefinite" restart="never" nodeType="tmRoot"/>
+      </p:par>
+    </p:tnLst>
+  </p:timing>
+</p:sld>
+</file>
+
+<file path=ppt/slides/slide8.xml><?xml version="1.0" encoding="utf-8"?>
+<p:sld xmlns:a="http://schemas.openxmlformats.org/drawingml/2006/main" xmlns:r="http://schemas.openxmlformats.org/officeDocument/2006/relationships" xmlns:p="http://schemas.openxmlformats.org/presentationml/2006/main">
+  <p:cSld>
+    <p:spTree>
+      <p:nvGrpSpPr>
+        <p:cNvPr id="1" name=""/>
+        <p:cNvGrpSpPr/>
+        <p:nvPr/>
+      </p:nvGrpSpPr>
+      <p:grpSpPr>
+        <a:xfrm>
+          <a:off x="0" y="0"/>
+          <a:ext cx="0" cy="0"/>
+          <a:chOff x="0" y="0"/>
+          <a:chExt cx="0" cy="0"/>
+        </a:xfrm>
+      </p:grpSpPr>
+      <p:pic>
+        <p:nvPicPr>
+          <p:cNvPr id="5" name="Picture 4" descr="images.png"/>
+          <p:cNvPicPr>
+            <a:picLocks noChangeAspect="1"/>
+          </p:cNvPicPr>
+          <p:nvPr/>
+        </p:nvPicPr>
+        <p:blipFill>
+          <a:blip r:embed="rId2">
+            <a:extLst>
+              <a:ext uri="{BEBA8EAE-BF5A-486C-A8C5-ECC9F3942E4B}">
+                <a14:imgProps xmlns:a14="http://schemas.microsoft.com/office/drawing/2010/main">
+                  <a14:imgLayer r:embed="rId3">
+                    <a14:imgEffect>
+                      <a14:backgroundRemoval t="889" b="98667" l="0" r="100000">
+                        <a14:foregroundMark x1="5333" y1="5333" x2="91556" y2="6222"/>
+                        <a14:foregroundMark x1="34667" y1="17333" x2="59556" y2="17333"/>
+                        <a14:foregroundMark x1="7111" y1="92444" x2="97778" y2="93778"/>
+                        <a14:backgroundMark x1="34222" y1="12444" x2="64444" y2="11111"/>
+                        <a14:backgroundMark x1="5333" y1="29778" x2="7111" y2="84889"/>
+                        <a14:backgroundMark x1="6222" y1="87556" x2="96000" y2="88000"/>
+                        <a14:backgroundMark x1="95111" y1="84889" x2="92889" y2="27556"/>
+                        <a14:backgroundMark x1="93333" y1="26667" x2="5333" y2="30667"/>
+                        <a14:backgroundMark x1="68000" y1="23111" x2="66222" y2="11111"/>
+                        <a14:backgroundMark x1="32444" y1="10222" x2="32444" y2="13778"/>
+                        <a14:backgroundMark x1="9333" y1="76889" x2="94222" y2="76889"/>
+                        <a14:backgroundMark x1="10222" y1="34222" x2="90667" y2="71556"/>
+                        <a14:backgroundMark x1="75111" y1="70667" x2="12000" y2="67556"/>
+                        <a14:backgroundMark x1="34667" y1="35111" x2="87111" y2="58222"/>
+                      </a14:backgroundRemoval>
+                    </a14:imgEffect>
+                  </a14:imgLayer>
+                </a14:imgProps>
+              </a:ext>
+              <a:ext uri="{28A0092B-C50C-407E-A947-70E740481C1C}">
+                <a14:useLocalDpi xmlns:a14="http://schemas.microsoft.com/office/drawing/2010/main" val="0"/>
+              </a:ext>
+            </a:extLst>
+          </a:blip>
+          <a:stretch>
+            <a:fillRect/>
+          </a:stretch>
+        </p:blipFill>
+        <p:spPr>
+          <a:xfrm>
+            <a:off x="515235" y="889698"/>
+            <a:ext cx="2212748" cy="2212748"/>
+          </a:xfrm>
+          <a:prstGeom prst="rect">
+            <a:avLst/>
+          </a:prstGeom>
+        </p:spPr>
+      </p:pic>
+    </p:spTree>
+    <p:extLst>
+      <p:ext uri="{BB962C8B-B14F-4D97-AF65-F5344CB8AC3E}">
+        <p14:creationId xmlns:p14="http://schemas.microsoft.com/office/powerpoint/2010/main" val="1935740795"/>
+      </p:ext>
+    </p:extLst>
+  </p:cSld>
+  <p:clrMapOvr>
+    <a:masterClrMapping/>
+  </p:clrMapOvr>
+  <p:timing>
+    <p:tnLst>
+      <p:par>
+        <p:cTn xmlns:p14="http://schemas.microsoft.com/office/powerpoint/2010/main" id="1" dur="indefinite" restart="never" nodeType="tmRoot"/>
+      </p:par>
+    </p:tnLst>
+  </p:timing>
+</p:sld>
+</file>
+
+<file path=ppt/slides/slide9.xml><?xml version="1.0" encoding="utf-8"?>
+<p:sld xmlns:a="http://schemas.openxmlformats.org/drawingml/2006/main" xmlns:r="http://schemas.openxmlformats.org/officeDocument/2006/relationships" xmlns:p="http://schemas.openxmlformats.org/presentationml/2006/main">
+  <p:cSld>
+    <p:spTree>
+      <p:nvGrpSpPr>
+        <p:cNvPr id="1" name=""/>
+        <p:cNvGrpSpPr/>
+        <p:nvPr/>
+      </p:nvGrpSpPr>
+      <p:grpSpPr>
+        <a:xfrm>
+          <a:off x="0" y="0"/>
+          <a:ext cx="0" cy="0"/>
+          <a:chOff x="0" y="0"/>
+          <a:chExt cx="0" cy="0"/>
+        </a:xfrm>
+      </p:grpSpPr>
+      <p:sp>
+        <p:nvSpPr>
+          <p:cNvPr id="2" name="Title 1"/>
+          <p:cNvSpPr>
+            <a:spLocks noGrp="1"/>
+          </p:cNvSpPr>
+          <p:nvPr>
+            <p:ph type="title"/>
+          </p:nvPr>
+        </p:nvSpPr>
+        <p:spPr/>
+        <p:txBody>
+          <a:bodyPr/>
+          <a:lstStyle/>
+          <a:p>
+            <a:endParaRPr lang="en-US"/>
+          </a:p>
+        </p:txBody>
+      </p:sp>
+      <p:sp>
+        <p:nvSpPr>
+          <p:cNvPr id="3" name="Content Placeholder 2"/>
+          <p:cNvSpPr>
+            <a:spLocks noGrp="1"/>
+          </p:cNvSpPr>
+          <p:nvPr>
+            <p:ph idx="1"/>
+          </p:nvPr>
+        </p:nvSpPr>
+        <p:spPr/>
+        <p:txBody>
+          <a:bodyPr/>
+          <a:lstStyle/>
+          <a:p>
+            <a:pPr>
+              <a:buFont typeface="+mj-lt"/>
+              <a:buAutoNum type="arabicPeriod"/>
+            </a:pPr>
+            <a:r>
+              <a:rPr lang="en-US" dirty="0" err="1" smtClean="0"/>
+              <a:t>SignUp</a:t>
+            </a:r>
+            <a:r>
+              <a:rPr lang="en-US" dirty="0" smtClean="0"/>
+              <a:t>/Login</a:t>
+            </a:r>
+          </a:p>
+          <a:p>
+            <a:pPr lvl="2"/>
+            <a:r>
+              <a:rPr lang="en-US" dirty="0" smtClean="0"/>
+              <a:t>Wayne w/ Passport</a:t>
+            </a:r>
+          </a:p>
+          <a:p>
+            <a:pPr>
+              <a:buFont typeface="+mj-lt"/>
+              <a:buAutoNum type="arabicPeriod"/>
+            </a:pPr>
+            <a:r>
+              <a:rPr lang="en-US" dirty="0" smtClean="0"/>
+              <a:t>Persistent search bar</a:t>
+            </a:r>
+          </a:p>
+          <a:p>
+            <a:pPr>
+              <a:buFont typeface="+mj-lt"/>
+              <a:buAutoNum type="arabicPeriod"/>
+            </a:pPr>
+            <a:endParaRPr lang="en-US" dirty="0" smtClean="0"/>
+          </a:p>
+          <a:p>
+            <a:pPr>
+              <a:buFont typeface="+mj-lt"/>
+              <a:buAutoNum type="arabicPeriod"/>
+            </a:pPr>
+            <a:endParaRPr lang="en-US" dirty="0"/>
+          </a:p>
+        </p:txBody>
+      </p:sp>
+    </p:spTree>
+    <p:extLst>
+      <p:ext uri="{BB962C8B-B14F-4D97-AF65-F5344CB8AC3E}">
+        <p14:creationId xmlns:p14="http://schemas.microsoft.com/office/powerpoint/2010/main" val="3862070844"/>
+      </p:ext>
+    </p:extLst>
+  </p:cSld>
+  <p:clrMapOvr>
+    <a:masterClrMapping/>
+  </p:clrMapOvr>
+  <p:timing>
+    <p:tnLst>
+      <p:par>
+        <p:cTn xmlns:p14="http://schemas.microsoft.com/office/powerpoint/2010/main" id="1" dur="indefinite" restart="never" nodeType="tmRoot"/>
+      </p:par>
+    </p:tnLst>
+  </p:timing>
+</p:sld>
+</file>
+
 <file path=ppt/theme/theme1.xml><?xml version="1.0" encoding="utf-8"?>
 <a:theme xmlns:a="http://schemas.openxmlformats.org/drawingml/2006/main" name="Angles">
   <a:themeElements>

</xml_diff>

<commit_message>
adding images for cards and logos
</commit_message>
<xml_diff>
--- a/WanderMust_Proposal.pptx
+++ b/WanderMust_Proposal.pptx
@@ -11,9 +11,10 @@
     <p:sldId id="259" r:id="rId5"/>
     <p:sldId id="260" r:id="rId6"/>
     <p:sldId id="261" r:id="rId7"/>
-    <p:sldId id="262" r:id="rId8"/>
-    <p:sldId id="263" r:id="rId9"/>
-    <p:sldId id="264" r:id="rId10"/>
+    <p:sldId id="265" r:id="rId8"/>
+    <p:sldId id="262" r:id="rId9"/>
+    <p:sldId id="263" r:id="rId10"/>
+    <p:sldId id="264" r:id="rId11"/>
   </p:sldIdLst>
   <p:sldSz cx="7772400" cy="10058400"/>
   <p:notesSz cx="6858000" cy="9144000"/>
@@ -584,7 +585,7 @@
             <a:fld id="{E30E2307-1E40-4E12-8716-25BFDA8E7013}" type="datetime1">
               <a:rPr lang="en-US" smtClean="0"/>
               <a:pPr/>
-              <a:t>5/11/18</a:t>
+              <a:t>5/13/18</a:t>
             </a:fld>
             <a:endParaRPr lang="en-US"/>
           </a:p>
@@ -751,7 +752,7 @@
             <a:fld id="{E5CFCF5A-EA79-452C-A52C-1A2668C2E7DF}" type="datetime1">
               <a:rPr lang="en-US" smtClean="0"/>
               <a:pPr/>
-              <a:t>5/11/18</a:t>
+              <a:t>5/13/18</a:t>
             </a:fld>
             <a:endParaRPr lang="en-US"/>
           </a:p>
@@ -928,7 +929,7 @@
             <a:fld id="{2E5C4C28-BD4B-4892-9A2D-6E19BD753A9A}" type="datetime1">
               <a:rPr lang="en-US" smtClean="0"/>
               <a:pPr/>
-              <a:t>5/11/18</a:t>
+              <a:t>5/13/18</a:t>
             </a:fld>
             <a:endParaRPr lang="en-US"/>
           </a:p>
@@ -978,6 +979,92 @@
         </p:txBody>
       </p:sp>
     </p:spTree>
+  </p:cSld>
+  <p:clrMapOvr>
+    <a:masterClrMapping/>
+  </p:clrMapOvr>
+</p:sldLayout>
+</file>
+
+<file path=ppt/slideLayouts/slideLayout12.xml><?xml version="1.0" encoding="utf-8"?>
+<p:sldLayout xmlns:a="http://schemas.openxmlformats.org/drawingml/2006/main" xmlns:r="http://schemas.openxmlformats.org/officeDocument/2006/relationships" xmlns:p="http://schemas.openxmlformats.org/presentationml/2006/main" preserve="1" userDrawn="1">
+  <p:cSld name="Custom Layout">
+    <p:spTree>
+      <p:nvGrpSpPr>
+        <p:cNvPr id="1" name=""/>
+        <p:cNvGrpSpPr/>
+        <p:nvPr/>
+      </p:nvGrpSpPr>
+      <p:grpSpPr>
+        <a:xfrm>
+          <a:off x="0" y="0"/>
+          <a:ext cx="0" cy="0"/>
+          <a:chOff x="0" y="0"/>
+          <a:chExt cx="0" cy="0"/>
+        </a:xfrm>
+      </p:grpSpPr>
+      <p:sp>
+        <p:nvSpPr>
+          <p:cNvPr id="6" name="Rectangle 5"/>
+          <p:cNvSpPr/>
+          <p:nvPr userDrawn="1"/>
+        </p:nvSpPr>
+        <p:spPr>
+          <a:xfrm>
+            <a:off x="0" y="1"/>
+            <a:ext cx="7772400" cy="10058400"/>
+          </a:xfrm>
+          <a:prstGeom prst="rect">
+            <a:avLst/>
+          </a:prstGeom>
+          <a:solidFill>
+            <a:schemeClr val="bg1"/>
+          </a:solidFill>
+          <a:ln>
+            <a:solidFill>
+              <a:schemeClr val="bg1"/>
+            </a:solidFill>
+          </a:ln>
+          <a:effectLst/>
+        </p:spPr>
+        <p:style>
+          <a:lnRef idx="1">
+            <a:schemeClr val="accent1"/>
+          </a:lnRef>
+          <a:fillRef idx="3">
+            <a:schemeClr val="accent1"/>
+          </a:fillRef>
+          <a:effectRef idx="2">
+            <a:schemeClr val="accent1"/>
+          </a:effectRef>
+          <a:fontRef idx="minor">
+            <a:schemeClr val="lt1"/>
+          </a:fontRef>
+        </p:style>
+        <p:txBody>
+          <a:bodyPr rtlCol="0" anchor="ctr"/>
+          <a:lstStyle/>
+          <a:p>
+            <a:pPr algn="ctr"/>
+            <a:endParaRPr lang="en-US">
+              <a:ln>
+                <a:solidFill>
+                  <a:srgbClr val="FFFFFF"/>
+                </a:solidFill>
+              </a:ln>
+              <a:solidFill>
+                <a:srgbClr val="FFFFFF"/>
+              </a:solidFill>
+            </a:endParaRPr>
+          </a:p>
+        </p:txBody>
+      </p:sp>
+    </p:spTree>
+    <p:extLst>
+      <p:ext uri="{BB962C8B-B14F-4D97-AF65-F5344CB8AC3E}">
+        <p14:creationId xmlns:p14="http://schemas.microsoft.com/office/powerpoint/2010/main" val="796117038"/>
+      </p:ext>
+    </p:extLst>
   </p:cSld>
   <p:clrMapOvr>
     <a:masterClrMapping/>
@@ -1095,7 +1182,7 @@
             <a:fld id="{61FD9D02-426E-46C9-9EE9-0DE1EF8B2838}" type="datetime1">
               <a:rPr lang="en-US" smtClean="0"/>
               <a:pPr/>
-              <a:t>5/11/18</a:t>
+              <a:t>5/13/18</a:t>
             </a:fld>
             <a:endParaRPr lang="en-US"/>
           </a:p>
@@ -1650,7 +1737,7 @@
             <a:fld id="{7B8AEBBE-F8B2-42CF-9895-E86A608384EB}" type="datetime1">
               <a:rPr lang="en-US" smtClean="0"/>
               <a:pPr/>
-              <a:t>5/11/18</a:t>
+              <a:t>5/13/18</a:t>
             </a:fld>
             <a:endParaRPr lang="en-US"/>
           </a:p>
@@ -1912,7 +1999,7 @@
             <a:fld id="{E1FAA6B6-10E5-4810-BC9F-DA72D8452E73}" type="datetime1">
               <a:rPr lang="en-US" smtClean="0"/>
               <a:pPr/>
-              <a:t>5/11/18</a:t>
+              <a:t>5/13/18</a:t>
             </a:fld>
             <a:endParaRPr lang="en-US"/>
           </a:p>
@@ -2402,7 +2489,7 @@
             <a:fld id="{6D18D072-EF12-4AA2-BD71-ABC68B06D0E2}" type="datetime1">
               <a:rPr lang="en-US" smtClean="0"/>
               <a:pPr/>
-              <a:t>5/11/18</a:t>
+              <a:t>5/13/18</a:t>
             </a:fld>
             <a:endParaRPr lang="en-US"/>
           </a:p>
@@ -2517,7 +2604,7 @@
             <a:fld id="{B8CDBF60-6CC3-4B74-A60D-3486985E4346}" type="datetime1">
               <a:rPr lang="en-US" smtClean="0"/>
               <a:pPr/>
-              <a:t>5/11/18</a:t>
+              <a:t>5/13/18</a:t>
             </a:fld>
             <a:endParaRPr lang="en-US"/>
           </a:p>
@@ -2609,7 +2696,7 @@
             <a:fld id="{22714818-984F-4759-BF72-A33BDC1963BD}" type="datetime1">
               <a:rPr lang="en-US" smtClean="0"/>
               <a:pPr/>
-              <a:t>5/11/18</a:t>
+              <a:t>5/13/18</a:t>
             </a:fld>
             <a:endParaRPr lang="en-US"/>
           </a:p>
@@ -3041,7 +3128,7 @@
             <a:fld id="{9EA7E191-5F94-4FC1-B823-BD7CABF7FA06}" type="datetime1">
               <a:rPr lang="en-US" smtClean="0"/>
               <a:pPr/>
-              <a:t>5/11/18</a:t>
+              <a:t>5/13/18</a:t>
             </a:fld>
             <a:endParaRPr lang="en-US"/>
           </a:p>
@@ -3576,7 +3663,7 @@
             <a:fld id="{88856D55-EFBE-4F9B-8A5F-09D42CA22A9B}" type="datetime1">
               <a:rPr lang="en-US" smtClean="0"/>
               <a:pPr/>
-              <a:t>5/11/18</a:t>
+              <a:t>5/13/18</a:t>
             </a:fld>
             <a:endParaRPr lang="en-US"/>
           </a:p>
@@ -4418,7 +4505,7 @@
             <a:fld id="{9D1D110F-3F4E-48D9-B8AA-5D0E825AFDBA}" type="datetime1">
               <a:rPr lang="en-US" smtClean="0"/>
               <a:pPr/>
-              <a:t>5/11/18</a:t>
+              <a:t>5/13/18</a:t>
             </a:fld>
             <a:endParaRPr lang="en-US"/>
           </a:p>
@@ -4521,6 +4608,7 @@
     <p:sldLayoutId id="2147483765" r:id="rId9"/>
     <p:sldLayoutId id="2147483766" r:id="rId10"/>
     <p:sldLayoutId id="2147483767" r:id="rId11"/>
+    <p:sldLayoutId id="2147483768" r:id="rId12"/>
   </p:sldLayoutIdLst>
   <p:hf sldNum="0" hdr="0" ftr="0" dt="0"/>
   <p:txStyles>
@@ -4893,6 +4981,123 @@
 </p:sld>
 </file>
 
+<file path=ppt/slides/slide10.xml><?xml version="1.0" encoding="utf-8"?>
+<p:sld xmlns:a="http://schemas.openxmlformats.org/drawingml/2006/main" xmlns:r="http://schemas.openxmlformats.org/officeDocument/2006/relationships" xmlns:p="http://schemas.openxmlformats.org/presentationml/2006/main">
+  <p:cSld>
+    <p:spTree>
+      <p:nvGrpSpPr>
+        <p:cNvPr id="1" name=""/>
+        <p:cNvGrpSpPr/>
+        <p:nvPr/>
+      </p:nvGrpSpPr>
+      <p:grpSpPr>
+        <a:xfrm>
+          <a:off x="0" y="0"/>
+          <a:ext cx="0" cy="0"/>
+          <a:chOff x="0" y="0"/>
+          <a:chExt cx="0" cy="0"/>
+        </a:xfrm>
+      </p:grpSpPr>
+      <p:sp>
+        <p:nvSpPr>
+          <p:cNvPr id="2" name="Title 1"/>
+          <p:cNvSpPr>
+            <a:spLocks noGrp="1"/>
+          </p:cNvSpPr>
+          <p:nvPr>
+            <p:ph type="title"/>
+          </p:nvPr>
+        </p:nvSpPr>
+        <p:spPr/>
+        <p:txBody>
+          <a:bodyPr/>
+          <a:lstStyle/>
+          <a:p>
+            <a:endParaRPr lang="en-US"/>
+          </a:p>
+        </p:txBody>
+      </p:sp>
+      <p:sp>
+        <p:nvSpPr>
+          <p:cNvPr id="3" name="Content Placeholder 2"/>
+          <p:cNvSpPr>
+            <a:spLocks noGrp="1"/>
+          </p:cNvSpPr>
+          <p:nvPr>
+            <p:ph idx="1"/>
+          </p:nvPr>
+        </p:nvSpPr>
+        <p:spPr/>
+        <p:txBody>
+          <a:bodyPr/>
+          <a:lstStyle/>
+          <a:p>
+            <a:pPr>
+              <a:buFont typeface="+mj-lt"/>
+              <a:buAutoNum type="arabicPeriod"/>
+            </a:pPr>
+            <a:r>
+              <a:rPr lang="en-US" dirty="0" err="1" smtClean="0"/>
+              <a:t>SignUp</a:t>
+            </a:r>
+            <a:r>
+              <a:rPr lang="en-US" dirty="0" smtClean="0"/>
+              <a:t>/Login</a:t>
+            </a:r>
+          </a:p>
+          <a:p>
+            <a:pPr lvl="2"/>
+            <a:r>
+              <a:rPr lang="en-US" dirty="0" smtClean="0"/>
+              <a:t>Wayne w/ Passport</a:t>
+            </a:r>
+          </a:p>
+          <a:p>
+            <a:pPr>
+              <a:buFont typeface="+mj-lt"/>
+              <a:buAutoNum type="arabicPeriod"/>
+            </a:pPr>
+            <a:r>
+              <a:rPr lang="en-US" dirty="0" smtClean="0"/>
+              <a:t>Persistent search bar</a:t>
+            </a:r>
+          </a:p>
+          <a:p>
+            <a:pPr>
+              <a:buFont typeface="+mj-lt"/>
+              <a:buAutoNum type="arabicPeriod"/>
+            </a:pPr>
+            <a:endParaRPr lang="en-US" dirty="0" smtClean="0"/>
+          </a:p>
+          <a:p>
+            <a:pPr>
+              <a:buFont typeface="+mj-lt"/>
+              <a:buAutoNum type="arabicPeriod"/>
+            </a:pPr>
+            <a:endParaRPr lang="en-US" dirty="0"/>
+          </a:p>
+        </p:txBody>
+      </p:sp>
+    </p:spTree>
+    <p:extLst>
+      <p:ext uri="{BB962C8B-B14F-4D97-AF65-F5344CB8AC3E}">
+        <p14:creationId xmlns:p14="http://schemas.microsoft.com/office/powerpoint/2010/main" val="3862070844"/>
+      </p:ext>
+    </p:extLst>
+  </p:cSld>
+  <p:clrMapOvr>
+    <a:masterClrMapping/>
+  </p:clrMapOvr>
+  <p:timing>
+    <p:tnLst>
+      <p:par>
+        <p:cTn xmlns:p14="http://schemas.microsoft.com/office/powerpoint/2010/main" id="1" dur="indefinite" restart="never" nodeType="tmRoot"/>
+      </p:par>
+    </p:tnLst>
+  </p:timing>
+</p:sld>
+</file>
+
 <file path=ppt/slides/slide2.xml><?xml version="1.0" encoding="utf-8"?>
 <p:sld xmlns:a="http://schemas.openxmlformats.org/drawingml/2006/main" xmlns:r="http://schemas.openxmlformats.org/officeDocument/2006/relationships" xmlns:p="http://schemas.openxmlformats.org/presentationml/2006/main">
   <p:cSld>
@@ -5157,9 +5362,8 @@
             <a:avLst/>
           </a:prstGeom>
           <a:solidFill>
-            <a:schemeClr val="accent6">
-              <a:lumMod val="60000"/>
-              <a:lumOff val="40000"/>
+            <a:schemeClr val="bg1">
+              <a:lumMod val="50000"/>
             </a:schemeClr>
           </a:solidFill>
         </p:spPr>
@@ -5517,7 +5721,7 @@
         </p:blipFill>
         <p:spPr>
           <a:xfrm>
-            <a:off x="-785907" y="1500093"/>
+            <a:off x="-785907" y="1341120"/>
             <a:ext cx="8558307" cy="8558307"/>
           </a:xfrm>
           <a:prstGeom prst="rect">
@@ -5724,10 +5928,7 @@
             <a:avLst/>
           </a:prstGeom>
           <a:solidFill>
-            <a:schemeClr val="accent6">
-              <a:lumMod val="60000"/>
-              <a:lumOff val="40000"/>
-            </a:schemeClr>
+            <a:srgbClr val="7F7F7F"/>
           </a:solidFill>
         </p:spPr>
         <p:style>
@@ -6433,7 +6634,7 @@
         </p:blipFill>
         <p:spPr>
           <a:xfrm>
-            <a:off x="-539465" y="1556961"/>
+            <a:off x="-502493" y="1622824"/>
             <a:ext cx="8558307" cy="8558307"/>
           </a:xfrm>
           <a:prstGeom prst="rect">
@@ -6493,10 +6694,7 @@
             <a:avLst/>
           </a:prstGeom>
           <a:solidFill>
-            <a:schemeClr val="accent6">
-              <a:lumMod val="60000"/>
-              <a:lumOff val="40000"/>
-            </a:schemeClr>
+            <a:srgbClr val="7F7F7F"/>
           </a:solidFill>
         </p:spPr>
         <p:style>
@@ -7078,7 +7276,7 @@
         </p:blipFill>
         <p:spPr>
           <a:xfrm>
-            <a:off x="-482596" y="1500093"/>
+            <a:off x="-507996" y="1500093"/>
             <a:ext cx="8558307" cy="8558307"/>
           </a:xfrm>
           <a:prstGeom prst="rect">
@@ -7360,6 +7558,232 @@
 </file>
 
 <file path=ppt/slides/slide7.xml><?xml version="1.0" encoding="utf-8"?>
+<p:sld xmlns:a="http://schemas.openxmlformats.org/drawingml/2006/main" xmlns:r="http://schemas.openxmlformats.org/officeDocument/2006/relationships" xmlns:p="http://schemas.openxmlformats.org/presentationml/2006/main">
+  <p:cSld>
+    <p:spTree>
+      <p:nvGrpSpPr>
+        <p:cNvPr id="1" name=""/>
+        <p:cNvGrpSpPr/>
+        <p:nvPr/>
+      </p:nvGrpSpPr>
+      <p:grpSpPr>
+        <a:xfrm>
+          <a:off x="0" y="0"/>
+          <a:ext cx="0" cy="0"/>
+          <a:chOff x="0" y="0"/>
+          <a:chExt cx="0" cy="0"/>
+        </a:xfrm>
+      </p:grpSpPr>
+      <p:pic>
+        <p:nvPicPr>
+          <p:cNvPr id="2" name="Picture 1"/>
+          <p:cNvPicPr>
+            <a:picLocks noChangeAspect="1"/>
+          </p:cNvPicPr>
+          <p:nvPr/>
+        </p:nvPicPr>
+        <p:blipFill>
+          <a:blip r:embed="rId2"/>
+          <a:stretch>
+            <a:fillRect/>
+          </a:stretch>
+        </p:blipFill>
+        <p:spPr>
+          <a:xfrm>
+            <a:off x="446594" y="345206"/>
+            <a:ext cx="6545821" cy="8401851"/>
+          </a:xfrm>
+          <a:prstGeom prst="rect">
+            <a:avLst/>
+          </a:prstGeom>
+        </p:spPr>
+      </p:pic>
+      <p:sp>
+        <p:nvSpPr>
+          <p:cNvPr id="3" name="Rounded Rectangle 2"/>
+          <p:cNvSpPr/>
+          <p:nvPr/>
+        </p:nvSpPr>
+        <p:spPr>
+          <a:xfrm>
+            <a:off x="893650" y="1928579"/>
+            <a:ext cx="5534356" cy="6818478"/>
+          </a:xfrm>
+          <a:prstGeom prst="roundRect">
+            <a:avLst/>
+          </a:prstGeom>
+          <a:solidFill>
+            <a:srgbClr val="FFFFFF"/>
+          </a:solidFill>
+          <a:ln>
+            <a:solidFill>
+              <a:srgbClr val="FFFFFF"/>
+            </a:solidFill>
+          </a:ln>
+          <a:effectLst/>
+        </p:spPr>
+        <p:style>
+          <a:lnRef idx="1">
+            <a:schemeClr val="accent1"/>
+          </a:lnRef>
+          <a:fillRef idx="3">
+            <a:schemeClr val="accent1"/>
+          </a:fillRef>
+          <a:effectRef idx="2">
+            <a:schemeClr val="accent1"/>
+          </a:effectRef>
+          <a:fontRef idx="minor">
+            <a:schemeClr val="lt1"/>
+          </a:fontRef>
+        </p:style>
+        <p:txBody>
+          <a:bodyPr rtlCol="0" anchor="ctr"/>
+          <a:lstStyle/>
+          <a:p>
+            <a:pPr algn="ctr"/>
+            <a:endParaRPr lang="en-US"/>
+          </a:p>
+        </p:txBody>
+      </p:sp>
+      <p:pic>
+        <p:nvPicPr>
+          <p:cNvPr id="12" name="Picture 11" descr="suitcase_bangkok.png"/>
+          <p:cNvPicPr>
+            <a:picLocks noChangeAspect="1"/>
+          </p:cNvPicPr>
+          <p:nvPr/>
+        </p:nvPicPr>
+        <p:blipFill rotWithShape="1">
+          <a:blip r:embed="rId3">
+            <a:extLst>
+              <a:ext uri="{28A0092B-C50C-407E-A947-70E740481C1C}">
+                <a14:useLocalDpi xmlns:a14="http://schemas.microsoft.com/office/drawing/2010/main" val="0"/>
+              </a:ext>
+            </a:extLst>
+          </a:blip>
+          <a:srcRect/>
+          <a:stretch/>
+        </p:blipFill>
+        <p:spPr>
+          <a:xfrm>
+            <a:off x="1225694" y="1928579"/>
+            <a:ext cx="1944258" cy="1944258"/>
+          </a:xfrm>
+          <a:prstGeom prst="rect">
+            <a:avLst/>
+          </a:prstGeom>
+        </p:spPr>
+      </p:pic>
+      <p:pic>
+        <p:nvPicPr>
+          <p:cNvPr id="13" name="Picture 12" descr="suitcase_chicago.png"/>
+          <p:cNvPicPr>
+            <a:picLocks noChangeAspect="1"/>
+          </p:cNvPicPr>
+          <p:nvPr/>
+        </p:nvPicPr>
+        <p:blipFill>
+          <a:blip r:embed="rId4">
+            <a:extLst>
+              <a:ext uri="{28A0092B-C50C-407E-A947-70E740481C1C}">
+                <a14:useLocalDpi xmlns:a14="http://schemas.microsoft.com/office/drawing/2010/main" val="0"/>
+              </a:ext>
+            </a:extLst>
+          </a:blip>
+          <a:stretch>
+            <a:fillRect/>
+          </a:stretch>
+        </p:blipFill>
+        <p:spPr>
+          <a:xfrm>
+            <a:off x="4123331" y="1928579"/>
+            <a:ext cx="1959758" cy="1959758"/>
+          </a:xfrm>
+          <a:prstGeom prst="rect">
+            <a:avLst/>
+          </a:prstGeom>
+        </p:spPr>
+      </p:pic>
+      <p:pic>
+        <p:nvPicPr>
+          <p:cNvPr id="14" name="Picture 13" descr="suitcase_chicago.png"/>
+          <p:cNvPicPr>
+            <a:picLocks noChangeAspect="1"/>
+          </p:cNvPicPr>
+          <p:nvPr/>
+        </p:nvPicPr>
+        <p:blipFill>
+          <a:blip r:embed="rId4">
+            <a:extLst>
+              <a:ext uri="{28A0092B-C50C-407E-A947-70E740481C1C}">
+                <a14:useLocalDpi xmlns:a14="http://schemas.microsoft.com/office/drawing/2010/main" val="0"/>
+              </a:ext>
+            </a:extLst>
+          </a:blip>
+          <a:stretch>
+            <a:fillRect/>
+          </a:stretch>
+        </p:blipFill>
+        <p:spPr>
+          <a:xfrm>
+            <a:off x="1225694" y="4112979"/>
+            <a:ext cx="1959758" cy="1959758"/>
+          </a:xfrm>
+          <a:prstGeom prst="rect">
+            <a:avLst/>
+          </a:prstGeom>
+        </p:spPr>
+      </p:pic>
+      <p:pic>
+        <p:nvPicPr>
+          <p:cNvPr id="15" name="Picture 14" descr="suitcase_bangkok.png"/>
+          <p:cNvPicPr>
+            <a:picLocks noChangeAspect="1"/>
+          </p:cNvPicPr>
+          <p:nvPr/>
+        </p:nvPicPr>
+        <p:blipFill rotWithShape="1">
+          <a:blip r:embed="rId3">
+            <a:extLst>
+              <a:ext uri="{28A0092B-C50C-407E-A947-70E740481C1C}">
+                <a14:useLocalDpi xmlns:a14="http://schemas.microsoft.com/office/drawing/2010/main" val="0"/>
+              </a:ext>
+            </a:extLst>
+          </a:blip>
+          <a:srcRect/>
+          <a:stretch/>
+        </p:blipFill>
+        <p:spPr>
+          <a:xfrm>
+            <a:off x="4123331" y="4128479"/>
+            <a:ext cx="1944258" cy="1944258"/>
+          </a:xfrm>
+          <a:prstGeom prst="rect">
+            <a:avLst/>
+          </a:prstGeom>
+        </p:spPr>
+      </p:pic>
+    </p:spTree>
+    <p:extLst>
+      <p:ext uri="{BB962C8B-B14F-4D97-AF65-F5344CB8AC3E}">
+        <p14:creationId xmlns:p14="http://schemas.microsoft.com/office/powerpoint/2010/main" val="786664040"/>
+      </p:ext>
+    </p:extLst>
+  </p:cSld>
+  <p:clrMapOvr>
+    <a:masterClrMapping/>
+  </p:clrMapOvr>
+  <p:timing>
+    <p:tnLst>
+      <p:par>
+        <p:cTn xmlns:p14="http://schemas.microsoft.com/office/powerpoint/2010/main" id="1" dur="indefinite" restart="never" nodeType="tmRoot"/>
+      </p:par>
+    </p:tnLst>
+  </p:timing>
+</p:sld>
+</file>
+
+<file path=ppt/slides/slide8.xml><?xml version="1.0" encoding="utf-8"?>
 <p:sld xmlns:a="http://schemas.openxmlformats.org/drawingml/2006/main" xmlns:r="http://schemas.openxmlformats.org/officeDocument/2006/relationships" xmlns:p="http://schemas.openxmlformats.org/presentationml/2006/main">
   <p:cSld>
     <p:spTree>
@@ -7829,7 +8253,7 @@
 </p:sld>
 </file>
 
-<file path=ppt/slides/slide8.xml><?xml version="1.0" encoding="utf-8"?>
+<file path=ppt/slides/slide9.xml><?xml version="1.0" encoding="utf-8"?>
 <p:sld xmlns:a="http://schemas.openxmlformats.org/drawingml/2006/main" xmlns:r="http://schemas.openxmlformats.org/officeDocument/2006/relationships" xmlns:p="http://schemas.openxmlformats.org/presentationml/2006/main">
   <p:cSld>
     <p:spTree>
@@ -7920,162 +8344,45 @@
 </p:sld>
 </file>
 
-<file path=ppt/slides/slide9.xml><?xml version="1.0" encoding="utf-8"?>
-<p:sld xmlns:a="http://schemas.openxmlformats.org/drawingml/2006/main" xmlns:r="http://schemas.openxmlformats.org/officeDocument/2006/relationships" xmlns:p="http://schemas.openxmlformats.org/presentationml/2006/main">
-  <p:cSld>
-    <p:spTree>
-      <p:nvGrpSpPr>
-        <p:cNvPr id="1" name=""/>
-        <p:cNvGrpSpPr/>
-        <p:nvPr/>
-      </p:nvGrpSpPr>
-      <p:grpSpPr>
-        <a:xfrm>
-          <a:off x="0" y="0"/>
-          <a:ext cx="0" cy="0"/>
-          <a:chOff x="0" y="0"/>
-          <a:chExt cx="0" cy="0"/>
-        </a:xfrm>
-      </p:grpSpPr>
-      <p:sp>
-        <p:nvSpPr>
-          <p:cNvPr id="2" name="Title 1"/>
-          <p:cNvSpPr>
-            <a:spLocks noGrp="1"/>
-          </p:cNvSpPr>
-          <p:nvPr>
-            <p:ph type="title"/>
-          </p:nvPr>
-        </p:nvSpPr>
-        <p:spPr/>
-        <p:txBody>
-          <a:bodyPr/>
-          <a:lstStyle/>
-          <a:p>
-            <a:endParaRPr lang="en-US"/>
-          </a:p>
-        </p:txBody>
-      </p:sp>
-      <p:sp>
-        <p:nvSpPr>
-          <p:cNvPr id="3" name="Content Placeholder 2"/>
-          <p:cNvSpPr>
-            <a:spLocks noGrp="1"/>
-          </p:cNvSpPr>
-          <p:nvPr>
-            <p:ph idx="1"/>
-          </p:nvPr>
-        </p:nvSpPr>
-        <p:spPr/>
-        <p:txBody>
-          <a:bodyPr/>
-          <a:lstStyle/>
-          <a:p>
-            <a:pPr>
-              <a:buFont typeface="+mj-lt"/>
-              <a:buAutoNum type="arabicPeriod"/>
-            </a:pPr>
-            <a:r>
-              <a:rPr lang="en-US" dirty="0" err="1" smtClean="0"/>
-              <a:t>SignUp</a:t>
-            </a:r>
-            <a:r>
-              <a:rPr lang="en-US" dirty="0" smtClean="0"/>
-              <a:t>/Login</a:t>
-            </a:r>
-          </a:p>
-          <a:p>
-            <a:pPr lvl="2"/>
-            <a:r>
-              <a:rPr lang="en-US" dirty="0" smtClean="0"/>
-              <a:t>Wayne w/ Passport</a:t>
-            </a:r>
-          </a:p>
-          <a:p>
-            <a:pPr>
-              <a:buFont typeface="+mj-lt"/>
-              <a:buAutoNum type="arabicPeriod"/>
-            </a:pPr>
-            <a:r>
-              <a:rPr lang="en-US" dirty="0" smtClean="0"/>
-              <a:t>Persistent search bar</a:t>
-            </a:r>
-          </a:p>
-          <a:p>
-            <a:pPr>
-              <a:buFont typeface="+mj-lt"/>
-              <a:buAutoNum type="arabicPeriod"/>
-            </a:pPr>
-            <a:endParaRPr lang="en-US" dirty="0" smtClean="0"/>
-          </a:p>
-          <a:p>
-            <a:pPr>
-              <a:buFont typeface="+mj-lt"/>
-              <a:buAutoNum type="arabicPeriod"/>
-            </a:pPr>
-            <a:endParaRPr lang="en-US" dirty="0"/>
-          </a:p>
-        </p:txBody>
-      </p:sp>
-    </p:spTree>
-    <p:extLst>
-      <p:ext uri="{BB962C8B-B14F-4D97-AF65-F5344CB8AC3E}">
-        <p14:creationId xmlns:p14="http://schemas.microsoft.com/office/powerpoint/2010/main" val="3862070844"/>
-      </p:ext>
-    </p:extLst>
-  </p:cSld>
-  <p:clrMapOvr>
-    <a:masterClrMapping/>
-  </p:clrMapOvr>
-  <p:timing>
-    <p:tnLst>
-      <p:par>
-        <p:cTn xmlns:p14="http://schemas.microsoft.com/office/powerpoint/2010/main" id="1" dur="indefinite" restart="never" nodeType="tmRoot"/>
-      </p:par>
-    </p:tnLst>
-  </p:timing>
-</p:sld>
-</file>
-
 <file path=ppt/theme/theme1.xml><?xml version="1.0" encoding="utf-8"?>
 <a:theme xmlns:a="http://schemas.openxmlformats.org/drawingml/2006/main" name="Angles">
   <a:themeElements>
-    <a:clrScheme name="Angles">
+    <a:clrScheme name="Advantage">
       <a:dk1>
-        <a:srgbClr val="000000"/>
+        <a:sysClr val="windowText" lastClr="000000"/>
       </a:dk1>
       <a:lt1>
-        <a:srgbClr val="FFFFFF"/>
+        <a:sysClr val="window" lastClr="FFFFFF"/>
       </a:lt1>
       <a:dk2>
-        <a:srgbClr val="434342"/>
+        <a:srgbClr val="2B142D"/>
       </a:dk2>
       <a:lt2>
-        <a:srgbClr val="CDD7D9"/>
+        <a:srgbClr val="C3AFCC"/>
       </a:lt2>
       <a:accent1>
-        <a:srgbClr val="797B7E"/>
+        <a:srgbClr val="663366"/>
       </a:accent1>
       <a:accent2>
-        <a:srgbClr val="F96A1B"/>
+        <a:srgbClr val="330F42"/>
       </a:accent2>
       <a:accent3>
-        <a:srgbClr val="08A1D9"/>
+        <a:srgbClr val="666699"/>
       </a:accent3>
       <a:accent4>
-        <a:srgbClr val="7C984A"/>
+        <a:srgbClr val="999966"/>
       </a:accent4>
       <a:accent5>
-        <a:srgbClr val="C2AD8D"/>
+        <a:srgbClr val="F7901E"/>
       </a:accent5>
       <a:accent6>
-        <a:srgbClr val="506E94"/>
+        <a:srgbClr val="A3A101"/>
       </a:accent6>
       <a:hlink>
-        <a:srgbClr val="5F5F5F"/>
+        <a:srgbClr val="BC5FBC"/>
       </a:hlink>
       <a:folHlink>
-        <a:srgbClr val="969696"/>
+        <a:srgbClr val="9775A7"/>
       </a:folHlink>
     </a:clrScheme>
     <a:fontScheme name="Angles">

</xml_diff>

<commit_message>
bringing up to date to pull
</commit_message>
<xml_diff>
--- a/WanderMust_Proposal.pptx
+++ b/WanderMust_Proposal.pptx
@@ -16,6 +16,7 @@
     <p:sldId id="263" r:id="rId10"/>
     <p:sldId id="264" r:id="rId11"/>
     <p:sldId id="266" r:id="rId12"/>
+    <p:sldId id="267" r:id="rId13"/>
   </p:sldIdLst>
   <p:sldSz cx="7772400" cy="10058400"/>
   <p:notesSz cx="6858000" cy="9144000"/>
@@ -586,7 +587,7 @@
             <a:fld id="{E30E2307-1E40-4E12-8716-25BFDA8E7013}" type="datetime1">
               <a:rPr lang="en-US" smtClean="0"/>
               <a:pPr/>
-              <a:t>5/21/18</a:t>
+              <a:t>6/14/18</a:t>
             </a:fld>
             <a:endParaRPr lang="en-US"/>
           </a:p>
@@ -753,7 +754,7 @@
             <a:fld id="{E5CFCF5A-EA79-452C-A52C-1A2668C2E7DF}" type="datetime1">
               <a:rPr lang="en-US" smtClean="0"/>
               <a:pPr/>
-              <a:t>5/21/18</a:t>
+              <a:t>6/14/18</a:t>
             </a:fld>
             <a:endParaRPr lang="en-US"/>
           </a:p>
@@ -930,7 +931,7 @@
             <a:fld id="{2E5C4C28-BD4B-4892-9A2D-6E19BD753A9A}" type="datetime1">
               <a:rPr lang="en-US" smtClean="0"/>
               <a:pPr/>
-              <a:t>5/21/18</a:t>
+              <a:t>6/14/18</a:t>
             </a:fld>
             <a:endParaRPr lang="en-US"/>
           </a:p>
@@ -1183,7 +1184,7 @@
             <a:fld id="{61FD9D02-426E-46C9-9EE9-0DE1EF8B2838}" type="datetime1">
               <a:rPr lang="en-US" smtClean="0"/>
               <a:pPr/>
-              <a:t>5/21/18</a:t>
+              <a:t>6/14/18</a:t>
             </a:fld>
             <a:endParaRPr lang="en-US"/>
           </a:p>
@@ -1738,7 +1739,7 @@
             <a:fld id="{7B8AEBBE-F8B2-42CF-9895-E86A608384EB}" type="datetime1">
               <a:rPr lang="en-US" smtClean="0"/>
               <a:pPr/>
-              <a:t>5/21/18</a:t>
+              <a:t>6/14/18</a:t>
             </a:fld>
             <a:endParaRPr lang="en-US"/>
           </a:p>
@@ -2000,7 +2001,7 @@
             <a:fld id="{E1FAA6B6-10E5-4810-BC9F-DA72D8452E73}" type="datetime1">
               <a:rPr lang="en-US" smtClean="0"/>
               <a:pPr/>
-              <a:t>5/21/18</a:t>
+              <a:t>6/14/18</a:t>
             </a:fld>
             <a:endParaRPr lang="en-US"/>
           </a:p>
@@ -2490,7 +2491,7 @@
             <a:fld id="{6D18D072-EF12-4AA2-BD71-ABC68B06D0E2}" type="datetime1">
               <a:rPr lang="en-US" smtClean="0"/>
               <a:pPr/>
-              <a:t>5/21/18</a:t>
+              <a:t>6/14/18</a:t>
             </a:fld>
             <a:endParaRPr lang="en-US"/>
           </a:p>
@@ -2605,7 +2606,7 @@
             <a:fld id="{B8CDBF60-6CC3-4B74-A60D-3486985E4346}" type="datetime1">
               <a:rPr lang="en-US" smtClean="0"/>
               <a:pPr/>
-              <a:t>5/21/18</a:t>
+              <a:t>6/14/18</a:t>
             </a:fld>
             <a:endParaRPr lang="en-US"/>
           </a:p>
@@ -2697,7 +2698,7 @@
             <a:fld id="{22714818-984F-4759-BF72-A33BDC1963BD}" type="datetime1">
               <a:rPr lang="en-US" smtClean="0"/>
               <a:pPr/>
-              <a:t>5/21/18</a:t>
+              <a:t>6/14/18</a:t>
             </a:fld>
             <a:endParaRPr lang="en-US"/>
           </a:p>
@@ -3129,7 +3130,7 @@
             <a:fld id="{9EA7E191-5F94-4FC1-B823-BD7CABF7FA06}" type="datetime1">
               <a:rPr lang="en-US" smtClean="0"/>
               <a:pPr/>
-              <a:t>5/21/18</a:t>
+              <a:t>6/14/18</a:t>
             </a:fld>
             <a:endParaRPr lang="en-US"/>
           </a:p>
@@ -3664,7 +3665,7 @@
             <a:fld id="{88856D55-EFBE-4F9B-8A5F-09D42CA22A9B}" type="datetime1">
               <a:rPr lang="en-US" smtClean="0"/>
               <a:pPr/>
-              <a:t>5/21/18</a:t>
+              <a:t>6/14/18</a:t>
             </a:fld>
             <a:endParaRPr lang="en-US"/>
           </a:p>
@@ -4506,7 +4507,7 @@
             <a:fld id="{9D1D110F-3F4E-48D9-B8AA-5D0E825AFDBA}" type="datetime1">
               <a:rPr lang="en-US" smtClean="0"/>
               <a:pPr/>
-              <a:t>5/21/18</a:t>
+              <a:t>6/14/18</a:t>
             </a:fld>
             <a:endParaRPr lang="en-US"/>
           </a:p>
@@ -5316,6 +5317,236 @@
 </p:sld>
 </file>
 
+<file path=ppt/slides/slide12.xml><?xml version="1.0" encoding="utf-8"?>
+<p:sld xmlns:a="http://schemas.openxmlformats.org/drawingml/2006/main" xmlns:r="http://schemas.openxmlformats.org/officeDocument/2006/relationships" xmlns:p="http://schemas.openxmlformats.org/presentationml/2006/main">
+  <p:cSld>
+    <p:spTree>
+      <p:nvGrpSpPr>
+        <p:cNvPr id="1" name=""/>
+        <p:cNvGrpSpPr/>
+        <p:nvPr/>
+      </p:nvGrpSpPr>
+      <p:grpSpPr>
+        <a:xfrm>
+          <a:off x="0" y="0"/>
+          <a:ext cx="0" cy="0"/>
+          <a:chOff x="0" y="0"/>
+          <a:chExt cx="0" cy="0"/>
+        </a:xfrm>
+      </p:grpSpPr>
+      <p:sp>
+        <p:nvSpPr>
+          <p:cNvPr id="2" name="Title 1"/>
+          <p:cNvSpPr>
+            <a:spLocks noGrp="1"/>
+          </p:cNvSpPr>
+          <p:nvPr>
+            <p:ph type="title"/>
+          </p:nvPr>
+        </p:nvSpPr>
+        <p:spPr/>
+        <p:txBody>
+          <a:bodyPr/>
+          <a:lstStyle/>
+          <a:p>
+            <a:r>
+              <a:rPr lang="en-US" dirty="0" smtClean="0"/>
+              <a:t>Upgrade</a:t>
+            </a:r>
+            <a:endParaRPr lang="en-US" dirty="0"/>
+          </a:p>
+        </p:txBody>
+      </p:sp>
+      <p:sp>
+        <p:nvSpPr>
+          <p:cNvPr id="3" name="Content Placeholder 2"/>
+          <p:cNvSpPr>
+            <a:spLocks noGrp="1"/>
+          </p:cNvSpPr>
+          <p:nvPr>
+            <p:ph idx="1"/>
+          </p:nvPr>
+        </p:nvSpPr>
+        <p:spPr/>
+        <p:txBody>
+          <a:bodyPr/>
+          <a:lstStyle/>
+          <a:p>
+            <a:pPr>
+              <a:buAutoNum type="arabicPeriod"/>
+            </a:pPr>
+            <a:r>
+              <a:rPr lang="en-US" dirty="0" smtClean="0"/>
+              <a:t>React </a:t>
+            </a:r>
+            <a:r>
+              <a:rPr lang="mr-IN" dirty="0" smtClean="0"/>
+              <a:t>–</a:t>
+            </a:r>
+            <a:r>
+              <a:rPr lang="en-US" dirty="0" smtClean="0"/>
+              <a:t> </a:t>
+            </a:r>
+            <a:r>
+              <a:rPr lang="en-US" dirty="0" err="1" smtClean="0"/>
+              <a:t>sql</a:t>
+            </a:r>
+            <a:r>
+              <a:rPr lang="en-US" dirty="0" smtClean="0"/>
+              <a:t> retrieval </a:t>
+            </a:r>
+            <a:r>
+              <a:rPr lang="mr-IN" dirty="0" smtClean="0"/>
+              <a:t>–</a:t>
+            </a:r>
+            <a:r>
+              <a:rPr lang="en-US" dirty="0" smtClean="0"/>
+              <a:t> </a:t>
+            </a:r>
+            <a:r>
+              <a:rPr lang="en-US" dirty="0" err="1" smtClean="0"/>
+              <a:t>Xander</a:t>
+            </a:r>
+            <a:r>
+              <a:rPr lang="en-US" dirty="0" smtClean="0"/>
+              <a:t> &amp; B</a:t>
+            </a:r>
+          </a:p>
+          <a:p>
+            <a:pPr lvl="2"/>
+            <a:r>
+              <a:rPr lang="en-US" dirty="0" err="1" smtClean="0"/>
+              <a:t>Axios</a:t>
+            </a:r>
+            <a:r>
+              <a:rPr lang="en-US" dirty="0" smtClean="0"/>
+              <a:t>???? &amp; </a:t>
+            </a:r>
+            <a:r>
+              <a:rPr lang="en-US" dirty="0" err="1" smtClean="0"/>
+              <a:t>Mern</a:t>
+            </a:r>
+            <a:endParaRPr lang="en-US" dirty="0" smtClean="0"/>
+          </a:p>
+          <a:p>
+            <a:pPr>
+              <a:buAutoNum type="arabicPeriod"/>
+            </a:pPr>
+            <a:r>
+              <a:rPr lang="en-US" dirty="0" err="1" smtClean="0"/>
+              <a:t>Cloudinary</a:t>
+            </a:r>
+            <a:r>
+              <a:rPr lang="en-US" dirty="0" smtClean="0"/>
+              <a:t> </a:t>
+            </a:r>
+            <a:r>
+              <a:rPr lang="mr-IN" dirty="0" smtClean="0"/>
+              <a:t>–</a:t>
+            </a:r>
+            <a:r>
+              <a:rPr lang="en-US" dirty="0" smtClean="0"/>
+              <a:t> Sam</a:t>
+            </a:r>
+          </a:p>
+          <a:p>
+            <a:pPr>
+              <a:buAutoNum type="arabicPeriod"/>
+            </a:pPr>
+            <a:r>
+              <a:rPr lang="en-US" dirty="0" smtClean="0"/>
+              <a:t>Travel Deals </a:t>
+            </a:r>
+            <a:r>
+              <a:rPr lang="en-US" smtClean="0"/>
+              <a:t>- Evan</a:t>
+            </a:r>
+            <a:endParaRPr lang="en-US" dirty="0" smtClean="0"/>
+          </a:p>
+          <a:p>
+            <a:pPr>
+              <a:buAutoNum type="arabicPeriod"/>
+            </a:pPr>
+            <a:r>
+              <a:rPr lang="en-US" dirty="0" smtClean="0"/>
+              <a:t>Passport </a:t>
+            </a:r>
+            <a:r>
+              <a:rPr lang="mr-IN" dirty="0" smtClean="0"/>
+              <a:t>–</a:t>
+            </a:r>
+            <a:r>
+              <a:rPr lang="en-US" dirty="0" smtClean="0"/>
+              <a:t> using react state - Wayne</a:t>
+            </a:r>
+          </a:p>
+          <a:p>
+            <a:pPr>
+              <a:buAutoNum type="arabicPeriod"/>
+            </a:pPr>
+            <a:r>
+              <a:rPr lang="en-US" dirty="0" smtClean="0"/>
+              <a:t>Finishing CRUD operations - Molly</a:t>
+            </a:r>
+          </a:p>
+          <a:p>
+            <a:pPr>
+              <a:buAutoNum type="arabicPeriod"/>
+            </a:pPr>
+            <a:r>
+              <a:rPr lang="en-US" dirty="0" smtClean="0"/>
+              <a:t>Persistent Search</a:t>
+            </a:r>
+          </a:p>
+          <a:p>
+            <a:pPr>
+              <a:buAutoNum type="arabicPeriod"/>
+            </a:pPr>
+            <a:r>
+              <a:rPr lang="en-US" dirty="0"/>
+              <a:t>Mongoose for social components/chats</a:t>
+            </a:r>
+          </a:p>
+          <a:p>
+            <a:pPr lvl="2"/>
+            <a:r>
+              <a:rPr lang="en-US" dirty="0"/>
+              <a:t>Social Wall</a:t>
+            </a:r>
+          </a:p>
+          <a:p>
+            <a:pPr>
+              <a:buAutoNum type="arabicPeriod"/>
+            </a:pPr>
+            <a:endParaRPr lang="en-US" dirty="0" smtClean="0"/>
+          </a:p>
+          <a:p>
+            <a:pPr>
+              <a:buAutoNum type="arabicPeriod"/>
+            </a:pPr>
+            <a:endParaRPr lang="en-US" dirty="0" smtClean="0"/>
+          </a:p>
+          <a:p>
+            <a:pPr>
+              <a:buAutoNum type="arabicPeriod"/>
+            </a:pPr>
+            <a:endParaRPr lang="en-US" dirty="0"/>
+          </a:p>
+        </p:txBody>
+      </p:sp>
+    </p:spTree>
+    <p:extLst>
+      <p:ext uri="{BB962C8B-B14F-4D97-AF65-F5344CB8AC3E}">
+        <p14:creationId xmlns:p14="http://schemas.microsoft.com/office/powerpoint/2010/main" val="1516949929"/>
+      </p:ext>
+    </p:extLst>
+  </p:cSld>
+  <p:clrMapOvr>
+    <a:masterClrMapping/>
+  </p:clrMapOvr>
+</p:sld>
+</file>
+
 <file path=ppt/slides/slide2.xml><?xml version="1.0" encoding="utf-8"?>
 <p:sld xmlns:a="http://schemas.openxmlformats.org/drawingml/2006/main" xmlns:r="http://schemas.openxmlformats.org/officeDocument/2006/relationships" xmlns:p="http://schemas.openxmlformats.org/presentationml/2006/main">
   <p:cSld>

</xml_diff>

<commit_message>
card text truncating and select all buttons taken down to fa
</commit_message>
<xml_diff>
--- a/WanderMust_Proposal.pptx
+++ b/WanderMust_Proposal.pptx
@@ -9,6 +9,7 @@
     <p:sldId id="257" r:id="rId3"/>
     <p:sldId id="258" r:id="rId4"/>
     <p:sldId id="260" r:id="rId5"/>
+    <p:sldId id="261" r:id="rId6"/>
   </p:sldIdLst>
   <p:sldSz cx="7772400" cy="10058400"/>
   <p:notesSz cx="6858000" cy="9144000"/>
@@ -579,7 +580,7 @@
             <a:fld id="{E30E2307-1E40-4E12-8716-25BFDA8E7013}" type="datetime1">
               <a:rPr lang="en-US" smtClean="0"/>
               <a:pPr/>
-              <a:t>6/22/18</a:t>
+              <a:t>7/2/18</a:t>
             </a:fld>
             <a:endParaRPr lang="en-US"/>
           </a:p>
@@ -746,7 +747,7 @@
             <a:fld id="{E5CFCF5A-EA79-452C-A52C-1A2668C2E7DF}" type="datetime1">
               <a:rPr lang="en-US" smtClean="0"/>
               <a:pPr/>
-              <a:t>6/22/18</a:t>
+              <a:t>7/2/18</a:t>
             </a:fld>
             <a:endParaRPr lang="en-US"/>
           </a:p>
@@ -923,7 +924,7 @@
             <a:fld id="{2E5C4C28-BD4B-4892-9A2D-6E19BD753A9A}" type="datetime1">
               <a:rPr lang="en-US" smtClean="0"/>
               <a:pPr/>
-              <a:t>6/22/18</a:t>
+              <a:t>7/2/18</a:t>
             </a:fld>
             <a:endParaRPr lang="en-US"/>
           </a:p>
@@ -1176,7 +1177,7 @@
             <a:fld id="{61FD9D02-426E-46C9-9EE9-0DE1EF8B2838}" type="datetime1">
               <a:rPr lang="en-US" smtClean="0"/>
               <a:pPr/>
-              <a:t>6/22/18</a:t>
+              <a:t>7/2/18</a:t>
             </a:fld>
             <a:endParaRPr lang="en-US"/>
           </a:p>
@@ -1731,7 +1732,7 @@
             <a:fld id="{7B8AEBBE-F8B2-42CF-9895-E86A608384EB}" type="datetime1">
               <a:rPr lang="en-US" smtClean="0"/>
               <a:pPr/>
-              <a:t>6/22/18</a:t>
+              <a:t>7/2/18</a:t>
             </a:fld>
             <a:endParaRPr lang="en-US"/>
           </a:p>
@@ -1993,7 +1994,7 @@
             <a:fld id="{E1FAA6B6-10E5-4810-BC9F-DA72D8452E73}" type="datetime1">
               <a:rPr lang="en-US" smtClean="0"/>
               <a:pPr/>
-              <a:t>6/22/18</a:t>
+              <a:t>7/2/18</a:t>
             </a:fld>
             <a:endParaRPr lang="en-US"/>
           </a:p>
@@ -2483,7 +2484,7 @@
             <a:fld id="{6D18D072-EF12-4AA2-BD71-ABC68B06D0E2}" type="datetime1">
               <a:rPr lang="en-US" smtClean="0"/>
               <a:pPr/>
-              <a:t>6/22/18</a:t>
+              <a:t>7/2/18</a:t>
             </a:fld>
             <a:endParaRPr lang="en-US"/>
           </a:p>
@@ -2598,7 +2599,7 @@
             <a:fld id="{B8CDBF60-6CC3-4B74-A60D-3486985E4346}" type="datetime1">
               <a:rPr lang="en-US" smtClean="0"/>
               <a:pPr/>
-              <a:t>6/22/18</a:t>
+              <a:t>7/2/18</a:t>
             </a:fld>
             <a:endParaRPr lang="en-US"/>
           </a:p>
@@ -2690,7 +2691,7 @@
             <a:fld id="{22714818-984F-4759-BF72-A33BDC1963BD}" type="datetime1">
               <a:rPr lang="en-US" smtClean="0"/>
               <a:pPr/>
-              <a:t>6/22/18</a:t>
+              <a:t>7/2/18</a:t>
             </a:fld>
             <a:endParaRPr lang="en-US"/>
           </a:p>
@@ -3122,7 +3123,7 @@
             <a:fld id="{9EA7E191-5F94-4FC1-B823-BD7CABF7FA06}" type="datetime1">
               <a:rPr lang="en-US" smtClean="0"/>
               <a:pPr/>
-              <a:t>6/22/18</a:t>
+              <a:t>7/2/18</a:t>
             </a:fld>
             <a:endParaRPr lang="en-US"/>
           </a:p>
@@ -3657,7 +3658,7 @@
             <a:fld id="{88856D55-EFBE-4F9B-8A5F-09D42CA22A9B}" type="datetime1">
               <a:rPr lang="en-US" smtClean="0"/>
               <a:pPr/>
-              <a:t>6/22/18</a:t>
+              <a:t>7/2/18</a:t>
             </a:fld>
             <a:endParaRPr lang="en-US"/>
           </a:p>
@@ -4499,7 +4500,7 @@
             <a:fld id="{9D1D110F-3F4E-48D9-B8AA-5D0E825AFDBA}" type="datetime1">
               <a:rPr lang="en-US" smtClean="0"/>
               <a:pPr/>
-              <a:t>6/22/18</a:t>
+              <a:t>7/2/18</a:t>
             </a:fld>
             <a:endParaRPr lang="en-US"/>
           </a:p>
@@ -8443,6 +8444,144 @@
 </p:sld>
 </file>
 
+<file path=ppt/slides/slide5.xml><?xml version="1.0" encoding="utf-8"?>
+<p:sld xmlns:a="http://schemas.openxmlformats.org/drawingml/2006/main" xmlns:r="http://schemas.openxmlformats.org/officeDocument/2006/relationships" xmlns:p="http://schemas.openxmlformats.org/presentationml/2006/main">
+  <p:cSld>
+    <p:spTree>
+      <p:nvGrpSpPr>
+        <p:cNvPr id="1" name=""/>
+        <p:cNvGrpSpPr/>
+        <p:nvPr/>
+      </p:nvGrpSpPr>
+      <p:grpSpPr>
+        <a:xfrm>
+          <a:off x="0" y="0"/>
+          <a:ext cx="0" cy="0"/>
+          <a:chOff x="0" y="0"/>
+          <a:chExt cx="0" cy="0"/>
+        </a:xfrm>
+      </p:grpSpPr>
+      <p:pic>
+        <p:nvPicPr>
+          <p:cNvPr id="2" name="Picture 1"/>
+          <p:cNvPicPr>
+            <a:picLocks noChangeAspect="1"/>
+          </p:cNvPicPr>
+          <p:nvPr/>
+        </p:nvPicPr>
+        <p:blipFill>
+          <a:blip r:embed="rId2"/>
+          <a:stretch>
+            <a:fillRect/>
+          </a:stretch>
+        </p:blipFill>
+        <p:spPr>
+          <a:xfrm>
+            <a:off x="292100" y="749300"/>
+            <a:ext cx="7188200" cy="8547100"/>
+          </a:xfrm>
+          <a:prstGeom prst="rect">
+            <a:avLst/>
+          </a:prstGeom>
+        </p:spPr>
+      </p:pic>
+      <p:sp>
+        <p:nvSpPr>
+          <p:cNvPr id="3" name="Rectangle 2"/>
+          <p:cNvSpPr/>
+          <p:nvPr/>
+        </p:nvSpPr>
+        <p:spPr>
+          <a:xfrm>
+            <a:off x="534731" y="2423207"/>
+            <a:ext cx="6684139" cy="4762857"/>
+          </a:xfrm>
+          <a:prstGeom prst="rect">
+            <a:avLst/>
+          </a:prstGeom>
+          <a:solidFill>
+            <a:schemeClr val="bg1"/>
+          </a:solidFill>
+          <a:ln>
+            <a:noFill/>
+          </a:ln>
+          <a:effectLst/>
+        </p:spPr>
+        <p:style>
+          <a:lnRef idx="1">
+            <a:schemeClr val="accent1"/>
+          </a:lnRef>
+          <a:fillRef idx="3">
+            <a:schemeClr val="accent1"/>
+          </a:fillRef>
+          <a:effectRef idx="2">
+            <a:schemeClr val="accent1"/>
+          </a:effectRef>
+          <a:fontRef idx="minor">
+            <a:schemeClr val="lt1"/>
+          </a:fontRef>
+        </p:style>
+        <p:txBody>
+          <a:bodyPr rtlCol="0" anchor="ctr"/>
+          <a:lstStyle/>
+          <a:p>
+            <a:pPr algn="ctr"/>
+            <a:endParaRPr lang="en-US"/>
+          </a:p>
+        </p:txBody>
+      </p:sp>
+      <p:sp>
+        <p:nvSpPr>
+          <p:cNvPr id="4" name="TextBox 3"/>
+          <p:cNvSpPr txBox="1"/>
+          <p:nvPr/>
+        </p:nvSpPr>
+        <p:spPr>
+          <a:xfrm>
+            <a:off x="785386" y="2423207"/>
+            <a:ext cx="6216249" cy="923330"/>
+          </a:xfrm>
+          <a:prstGeom prst="rect">
+            <a:avLst/>
+          </a:prstGeom>
+          <a:noFill/>
+        </p:spPr>
+        <p:txBody>
+          <a:bodyPr wrap="square" rtlCol="0">
+            <a:spAutoFit/>
+          </a:bodyPr>
+          <a:lstStyle/>
+          <a:p>
+            <a:r>
+              <a:rPr lang="en-US" dirty="0" smtClean="0"/>
+              <a:t>Title: My Days in Seattle</a:t>
+            </a:r>
+          </a:p>
+          <a:p>
+            <a:endParaRPr lang="en-US" dirty="0"/>
+          </a:p>
+          <a:p>
+            <a:r>
+              <a:rPr lang="en-US" dirty="0" smtClean="0"/>
+              <a:t>Notes: </a:t>
+            </a:r>
+            <a:endParaRPr lang="en-US" dirty="0"/>
+          </a:p>
+        </p:txBody>
+      </p:sp>
+    </p:spTree>
+    <p:extLst>
+      <p:ext uri="{BB962C8B-B14F-4D97-AF65-F5344CB8AC3E}">
+        <p14:creationId xmlns:p14="http://schemas.microsoft.com/office/powerpoint/2010/main" val="227226710"/>
+      </p:ext>
+    </p:extLst>
+  </p:cSld>
+  <p:clrMapOvr>
+    <a:masterClrMapping/>
+  </p:clrMapOvr>
+</p:sld>
+</file>
+
 <file path=ppt/theme/theme1.xml><?xml version="1.0" encoding="utf-8"?>
 <a:theme xmlns:a="http://schemas.openxmlformats.org/drawingml/2006/main" name="Angles">
   <a:themeElements>

</xml_diff>